<commit_message>
Präsentation und finaler Schliff
Alle zusammen
</commit_message>
<xml_diff>
--- a/4_Praesentation/CuttingInsert Finder.pptx
+++ b/4_Praesentation/CuttingInsert Finder.pptx
@@ -19,8 +19,8 @@
     <p:sldId id="270" r:id="rId10"/>
     <p:sldId id="262" r:id="rId11"/>
     <p:sldId id="263" r:id="rId12"/>
-    <p:sldId id="264" r:id="rId13"/>
-    <p:sldId id="265" r:id="rId14"/>
+    <p:sldId id="265" r:id="rId13"/>
+    <p:sldId id="271" r:id="rId14"/>
     <p:sldId id="267" r:id="rId15"/>
   </p:sldIdLst>
   <p:sldSz cx="12192000" cy="6858000"/>
@@ -120,6 +120,11 @@
       </a:defRPr>
     </a:lvl9pPr>
   </p:defaultTextStyle>
+  <p:extLst>
+    <p:ext uri="{EFAFB233-063F-42B5-8137-9DF3F51BA10A}">
+      <p15:sldGuideLst xmlns:p15="http://schemas.microsoft.com/office/powerpoint/2012/main"/>
+    </p:ext>
+  </p:extLst>
 </p:presentation>
 </file>
 
@@ -205,7 +210,7 @@
           <a:p>
             <a:fld id="{DBFBF256-5CCF-4CAB-8D53-8EA7332BB390}" type="datetimeFigureOut">
               <a:rPr lang="de-DE" smtClean="0"/>
-              <a:t>26.06.2022</a:t>
+              <a:t>27.06.2022</a:t>
             </a:fld>
             <a:endParaRPr lang="de-DE"/>
           </a:p>
@@ -617,9 +622,9 @@
           <a:bodyPr/>
           <a:lstStyle/>
           <a:p>
-            <a:fld id="{C4A454B1-4809-4F34-A9F4-187DF2EA3180}" type="datetime1">
+            <a:fld id="{D8F727B2-4A29-4EE7-AE74-BC1A12B0B8C9}" type="datetime1">
               <a:rPr lang="de-DE" smtClean="0"/>
-              <a:t>26.06.2022</a:t>
+              <a:t>27.06.2022</a:t>
             </a:fld>
             <a:endParaRPr lang="de-DE"/>
           </a:p>
@@ -648,7 +653,7 @@
           <a:p>
             <a:r>
               <a:rPr lang="de-DE"/>
-              <a:t>Cutting insert finder</a:t>
+              <a:t>Cutting-Insert-Finder</a:t>
             </a:r>
           </a:p>
         </p:txBody>
@@ -818,9 +823,9 @@
           <a:bodyPr/>
           <a:lstStyle/>
           <a:p>
-            <a:fld id="{97039DC3-D1DF-4E5D-9B26-BF401C589573}" type="datetime1">
+            <a:fld id="{52D2803A-38DA-42C9-9E63-72E5882FF1A1}" type="datetime1">
               <a:rPr lang="de-DE" smtClean="0"/>
-              <a:t>26.06.2022</a:t>
+              <a:t>27.06.2022</a:t>
             </a:fld>
             <a:endParaRPr lang="de-DE"/>
           </a:p>
@@ -849,7 +854,7 @@
           <a:p>
             <a:r>
               <a:rPr lang="de-DE"/>
-              <a:t>Cutting insert finder</a:t>
+              <a:t>Cutting-Insert-Finder</a:t>
             </a:r>
           </a:p>
         </p:txBody>
@@ -1029,9 +1034,9 @@
           <a:bodyPr/>
           <a:lstStyle/>
           <a:p>
-            <a:fld id="{4DF9F56F-2991-4900-BE93-F39A5464C867}" type="datetime1">
+            <a:fld id="{119F7D2E-6878-49CC-A33E-FF7083D3BD81}" type="datetime1">
               <a:rPr lang="de-DE" smtClean="0"/>
-              <a:t>26.06.2022</a:t>
+              <a:t>27.06.2022</a:t>
             </a:fld>
             <a:endParaRPr lang="de-DE"/>
           </a:p>
@@ -1060,7 +1065,7 @@
           <a:p>
             <a:r>
               <a:rPr lang="de-DE"/>
-              <a:t>Cutting insert finder</a:t>
+              <a:t>Cutting-Insert-Finder</a:t>
             </a:r>
           </a:p>
         </p:txBody>
@@ -1252,9 +1257,9 @@
           <a:bodyPr/>
           <a:lstStyle/>
           <a:p>
-            <a:fld id="{CCF396C0-B96A-4979-9B83-96C1A460A148}" type="datetime1">
+            <a:fld id="{46C888F3-F818-463D-8397-73966DC2E89A}" type="datetime1">
               <a:rPr lang="de-DE" smtClean="0"/>
-              <a:t>26.06.2022</a:t>
+              <a:t>27.06.2022</a:t>
             </a:fld>
             <a:endParaRPr lang="de-DE"/>
           </a:p>
@@ -1283,7 +1288,7 @@
           <a:p>
             <a:r>
               <a:rPr lang="de-DE"/>
-              <a:t>Cutting insert finder</a:t>
+              <a:t>Cutting-Insert-Finder</a:t>
             </a:r>
           </a:p>
         </p:txBody>
@@ -1453,9 +1458,9 @@
           <a:bodyPr/>
           <a:lstStyle/>
           <a:p>
-            <a:fld id="{8F962D44-FAD6-4EC3-BBB8-92A8CE149A35}" type="datetime1">
+            <a:fld id="{623714DF-8E82-48C9-BFC7-EFFC10B98342}" type="datetime1">
               <a:rPr lang="de-DE" smtClean="0"/>
-              <a:t>26.06.2022</a:t>
+              <a:t>27.06.2022</a:t>
             </a:fld>
             <a:endParaRPr lang="de-DE"/>
           </a:p>
@@ -1484,7 +1489,7 @@
           <a:p>
             <a:r>
               <a:rPr lang="de-DE"/>
-              <a:t>Cutting insert finder</a:t>
+              <a:t>Cutting-Insert-Finder</a:t>
             </a:r>
           </a:p>
         </p:txBody>
@@ -1731,9 +1736,9 @@
           <a:bodyPr/>
           <a:lstStyle/>
           <a:p>
-            <a:fld id="{D1ABA818-BD10-4EFE-9A1B-38DA05753797}" type="datetime1">
+            <a:fld id="{2BCB4BB1-412E-4F0D-B09A-485D218F8BC4}" type="datetime1">
               <a:rPr lang="de-DE" smtClean="0"/>
-              <a:t>26.06.2022</a:t>
+              <a:t>27.06.2022</a:t>
             </a:fld>
             <a:endParaRPr lang="de-DE"/>
           </a:p>
@@ -1762,7 +1767,7 @@
           <a:p>
             <a:r>
               <a:rPr lang="de-DE"/>
-              <a:t>Cutting insert finder</a:t>
+              <a:t>Cutting-Insert-Finder</a:t>
             </a:r>
           </a:p>
         </p:txBody>
@@ -1999,9 +2004,9 @@
           <a:bodyPr/>
           <a:lstStyle/>
           <a:p>
-            <a:fld id="{5BDF83C0-26F9-4EC0-BB98-345E30DEE80B}" type="datetime1">
+            <a:fld id="{58730097-F24E-4374-BA75-356BB8B1EAA4}" type="datetime1">
               <a:rPr lang="de-DE" smtClean="0"/>
-              <a:t>26.06.2022</a:t>
+              <a:t>27.06.2022</a:t>
             </a:fld>
             <a:endParaRPr lang="de-DE"/>
           </a:p>
@@ -2030,7 +2035,7 @@
           <a:p>
             <a:r>
               <a:rPr lang="de-DE"/>
-              <a:t>Cutting insert finder</a:t>
+              <a:t>Cutting-Insert-Finder</a:t>
             </a:r>
           </a:p>
         </p:txBody>
@@ -2414,9 +2419,9 @@
           <a:bodyPr/>
           <a:lstStyle/>
           <a:p>
-            <a:fld id="{E1EC5F84-CC10-441B-86F7-8EE8153BD772}" type="datetime1">
+            <a:fld id="{AA441C77-E391-42DD-902F-E20678918C24}" type="datetime1">
               <a:rPr lang="de-DE" smtClean="0"/>
-              <a:t>26.06.2022</a:t>
+              <a:t>27.06.2022</a:t>
             </a:fld>
             <a:endParaRPr lang="de-DE"/>
           </a:p>
@@ -2445,7 +2450,7 @@
           <a:p>
             <a:r>
               <a:rPr lang="de-DE"/>
-              <a:t>Cutting insert finder</a:t>
+              <a:t>Cutting-Insert-Finder</a:t>
             </a:r>
           </a:p>
         </p:txBody>
@@ -2558,9 +2563,9 @@
           <a:bodyPr/>
           <a:lstStyle/>
           <a:p>
-            <a:fld id="{CAF78857-9230-4545-B55F-1D9708A3B0D7}" type="datetime1">
+            <a:fld id="{ADCB90BE-9B3C-40C0-BE88-8A140E7AA8E3}" type="datetime1">
               <a:rPr lang="de-DE" smtClean="0"/>
-              <a:t>26.06.2022</a:t>
+              <a:t>27.06.2022</a:t>
             </a:fld>
             <a:endParaRPr lang="de-DE"/>
           </a:p>
@@ -2589,7 +2594,7 @@
           <a:p>
             <a:r>
               <a:rPr lang="de-DE"/>
-              <a:t>Cutting insert finder</a:t>
+              <a:t>Cutting-Insert-Finder</a:t>
             </a:r>
           </a:p>
         </p:txBody>
@@ -2674,9 +2679,9 @@
           <a:bodyPr/>
           <a:lstStyle/>
           <a:p>
-            <a:fld id="{848D2EBC-6B88-4729-9248-079198C76AE0}" type="datetime1">
+            <a:fld id="{1FD95ABE-54A8-4870-9100-095CCC2E6A6C}" type="datetime1">
               <a:rPr lang="de-DE" smtClean="0"/>
-              <a:t>26.06.2022</a:t>
+              <a:t>27.06.2022</a:t>
             </a:fld>
             <a:endParaRPr lang="de-DE"/>
           </a:p>
@@ -2705,7 +2710,7 @@
           <a:p>
             <a:r>
               <a:rPr lang="de-DE"/>
-              <a:t>Cutting insert finder</a:t>
+              <a:t>Cutting-Insert-Finder</a:t>
             </a:r>
           </a:p>
         </p:txBody>
@@ -2988,9 +2993,9 @@
           <a:bodyPr/>
           <a:lstStyle/>
           <a:p>
-            <a:fld id="{E682C983-DD77-4DF6-A698-AD1562EDBAFD}" type="datetime1">
+            <a:fld id="{501A7D2C-D873-4960-BCC8-D31958A21AD4}" type="datetime1">
               <a:rPr lang="de-DE" smtClean="0"/>
-              <a:t>26.06.2022</a:t>
+              <a:t>27.06.2022</a:t>
             </a:fld>
             <a:endParaRPr lang="de-DE"/>
           </a:p>
@@ -3019,7 +3024,7 @@
           <a:p>
             <a:r>
               <a:rPr lang="de-DE"/>
-              <a:t>Cutting insert finder</a:t>
+              <a:t>Cutting-Insert-Finder</a:t>
             </a:r>
           </a:p>
         </p:txBody>
@@ -3189,9 +3194,9 @@
           <a:bodyPr/>
           <a:lstStyle/>
           <a:p>
-            <a:fld id="{CE954C75-A67C-45E4-B436-5D1C7411D67E}" type="datetime1">
+            <a:fld id="{AC4739A8-142F-496B-A451-515C2AC6A2CF}" type="datetime1">
               <a:rPr lang="de-DE" smtClean="0"/>
-              <a:t>26.06.2022</a:t>
+              <a:t>27.06.2022</a:t>
             </a:fld>
             <a:endParaRPr lang="de-DE"/>
           </a:p>
@@ -3219,20 +3224,8 @@
           <a:lstStyle/>
           <a:p>
             <a:r>
-              <a:rPr lang="de-DE" dirty="0"/>
-              <a:t>Cutting </a:t>
-            </a:r>
-            <a:r>
-              <a:rPr lang="de-DE" dirty="0" err="1"/>
-              <a:t>insert</a:t>
-            </a:r>
-            <a:r>
-              <a:rPr lang="de-DE" dirty="0"/>
-              <a:t> </a:t>
-            </a:r>
-            <a:r>
-              <a:rPr lang="de-DE" dirty="0" err="1"/>
-              <a:t>finder</a:t>
+              <a:rPr lang="de-DE"/>
+              <a:t>Cutting-Insert-Finder</a:t>
             </a:r>
             <a:endParaRPr lang="de-DE" dirty="0"/>
           </a:p>
@@ -3257,13 +3250,18 @@
         <p:spPr/>
         <p:txBody>
           <a:bodyPr/>
-          <a:lstStyle/>
-          <a:p>
-            <a:fld id="{583B8968-6D66-415B-8179-7852D1E14363}" type="slidenum">
+          <a:lstStyle>
+            <a:lvl1pPr>
+              <a:defRPr/>
+            </a:lvl1pPr>
+          </a:lstStyle>
+          <a:p>
+            <a:fld id="{A9CD8630-C3CD-46DB-BE64-8561C8456588}" type="slidenum">
               <a:rPr lang="de-DE" smtClean="0"/>
+              <a:pPr/>
               <a:t>‹Nr.›</a:t>
             </a:fld>
-            <a:endParaRPr lang="de-DE"/>
+            <a:endParaRPr lang="de-DE" dirty="0"/>
           </a:p>
         </p:txBody>
       </p:sp>
@@ -3295,7 +3293,7 @@
         </p:blipFill>
         <p:spPr>
           <a:xfrm>
-            <a:off x="9982200" y="5950202"/>
+            <a:off x="10109123" y="5588505"/>
             <a:ext cx="1955122" cy="723395"/>
           </a:xfrm>
           <a:prstGeom prst="rect">
@@ -3559,9 +3557,9 @@
           <a:bodyPr/>
           <a:lstStyle/>
           <a:p>
-            <a:fld id="{CEFE16B5-4008-4487-BC5E-E37BAD49B298}" type="datetime1">
+            <a:fld id="{BF4C7669-95EB-4F1F-BBBB-7C9795A67525}" type="datetime1">
               <a:rPr lang="de-DE" smtClean="0"/>
-              <a:t>26.06.2022</a:t>
+              <a:t>27.06.2022</a:t>
             </a:fld>
             <a:endParaRPr lang="de-DE"/>
           </a:p>
@@ -3590,7 +3588,7 @@
           <a:p>
             <a:r>
               <a:rPr lang="de-DE"/>
-              <a:t>Cutting insert finder</a:t>
+              <a:t>Cutting-Insert-Finder</a:t>
             </a:r>
           </a:p>
         </p:txBody>
@@ -3760,9 +3758,9 @@
           <a:bodyPr/>
           <a:lstStyle/>
           <a:p>
-            <a:fld id="{7F972A52-598E-4DCD-811A-42ABA1D702E7}" type="datetime1">
+            <a:fld id="{A19DB1BD-A1B2-435B-9C16-30C0E4D278F8}" type="datetime1">
               <a:rPr lang="de-DE" smtClean="0"/>
-              <a:t>26.06.2022</a:t>
+              <a:t>27.06.2022</a:t>
             </a:fld>
             <a:endParaRPr lang="de-DE"/>
           </a:p>
@@ -3791,7 +3789,7 @@
           <a:p>
             <a:r>
               <a:rPr lang="de-DE"/>
-              <a:t>Cutting insert finder</a:t>
+              <a:t>Cutting-Insert-Finder</a:t>
             </a:r>
           </a:p>
         </p:txBody>
@@ -3971,9 +3969,9 @@
           <a:bodyPr/>
           <a:lstStyle/>
           <a:p>
-            <a:fld id="{A958A2DA-C5E6-4D82-ADF5-DDC381B94EE5}" type="datetime1">
+            <a:fld id="{A4C4C8A5-DF98-4C6B-A0FB-956A6A197D50}" type="datetime1">
               <a:rPr lang="de-DE" smtClean="0"/>
-              <a:t>26.06.2022</a:t>
+              <a:t>27.06.2022</a:t>
             </a:fld>
             <a:endParaRPr lang="de-DE"/>
           </a:p>
@@ -4002,7 +4000,7 @@
           <a:p>
             <a:r>
               <a:rPr lang="de-DE"/>
-              <a:t>Cutting insert finder</a:t>
+              <a:t>Cutting-Insert-Finder</a:t>
             </a:r>
           </a:p>
         </p:txBody>
@@ -4249,9 +4247,9 @@
           <a:bodyPr/>
           <a:lstStyle/>
           <a:p>
-            <a:fld id="{74A18998-885F-4320-A192-57BC3CA48712}" type="datetime1">
+            <a:fld id="{F087DBCA-9D97-472F-9F70-3A6FA2495802}" type="datetime1">
               <a:rPr lang="de-DE" smtClean="0"/>
-              <a:t>26.06.2022</a:t>
+              <a:t>27.06.2022</a:t>
             </a:fld>
             <a:endParaRPr lang="de-DE"/>
           </a:p>
@@ -4280,7 +4278,7 @@
           <a:p>
             <a:r>
               <a:rPr lang="de-DE"/>
-              <a:t>Cutting insert finder</a:t>
+              <a:t>Cutting-Insert-Finder</a:t>
             </a:r>
           </a:p>
         </p:txBody>
@@ -4517,9 +4515,9 @@
           <a:bodyPr/>
           <a:lstStyle/>
           <a:p>
-            <a:fld id="{08F36FBE-AAAE-431F-9580-8D529FEC7D0F}" type="datetime1">
+            <a:fld id="{3AAC8719-F055-4082-AF70-6660C1EC523B}" type="datetime1">
               <a:rPr lang="de-DE" smtClean="0"/>
-              <a:t>26.06.2022</a:t>
+              <a:t>27.06.2022</a:t>
             </a:fld>
             <a:endParaRPr lang="de-DE"/>
           </a:p>
@@ -4548,7 +4546,7 @@
           <a:p>
             <a:r>
               <a:rPr lang="de-DE"/>
-              <a:t>Cutting insert finder</a:t>
+              <a:t>Cutting-Insert-Finder</a:t>
             </a:r>
           </a:p>
         </p:txBody>
@@ -4932,9 +4930,9 @@
           <a:bodyPr/>
           <a:lstStyle/>
           <a:p>
-            <a:fld id="{D4D84F5E-BAEE-4F9A-966F-DDC11AA3E9AA}" type="datetime1">
+            <a:fld id="{6B3B0AD6-FE95-4741-AE04-27780123974E}" type="datetime1">
               <a:rPr lang="de-DE" smtClean="0"/>
-              <a:t>26.06.2022</a:t>
+              <a:t>27.06.2022</a:t>
             </a:fld>
             <a:endParaRPr lang="de-DE"/>
           </a:p>
@@ -4963,7 +4961,7 @@
           <a:p>
             <a:r>
               <a:rPr lang="de-DE"/>
-              <a:t>Cutting insert finder</a:t>
+              <a:t>Cutting-Insert-Finder</a:t>
             </a:r>
           </a:p>
         </p:txBody>
@@ -5076,9 +5074,9 @@
           <a:bodyPr/>
           <a:lstStyle/>
           <a:p>
-            <a:fld id="{F393093C-4C7C-4951-AA6A-5103B4646285}" type="datetime1">
+            <a:fld id="{C9F392CF-FEC6-405B-B82A-0094D9BC840B}" type="datetime1">
               <a:rPr lang="de-DE" smtClean="0"/>
-              <a:t>26.06.2022</a:t>
+              <a:t>27.06.2022</a:t>
             </a:fld>
             <a:endParaRPr lang="de-DE"/>
           </a:p>
@@ -5107,7 +5105,7 @@
           <a:p>
             <a:r>
               <a:rPr lang="de-DE"/>
-              <a:t>Cutting insert finder</a:t>
+              <a:t>Cutting-Insert-Finder</a:t>
             </a:r>
           </a:p>
         </p:txBody>
@@ -5192,9 +5190,9 @@
           <a:bodyPr/>
           <a:lstStyle/>
           <a:p>
-            <a:fld id="{DD571EFE-3672-455C-949F-2EEAAA223591}" type="datetime1">
+            <a:fld id="{E12F143C-4898-46A5-8A8F-9C22AEA65E6D}" type="datetime1">
               <a:rPr lang="de-DE" smtClean="0"/>
-              <a:t>26.06.2022</a:t>
+              <a:t>27.06.2022</a:t>
             </a:fld>
             <a:endParaRPr lang="de-DE"/>
           </a:p>
@@ -5223,7 +5221,7 @@
           <a:p>
             <a:r>
               <a:rPr lang="de-DE"/>
-              <a:t>Cutting insert finder</a:t>
+              <a:t>Cutting-Insert-Finder</a:t>
             </a:r>
           </a:p>
         </p:txBody>
@@ -5506,9 +5504,9 @@
           <a:bodyPr/>
           <a:lstStyle/>
           <a:p>
-            <a:fld id="{20F5A077-224A-4F0E-8B39-62A9C679AB84}" type="datetime1">
+            <a:fld id="{5E8B8B78-33DF-4735-9F61-A2185C74E9C6}" type="datetime1">
               <a:rPr lang="de-DE" smtClean="0"/>
-              <a:t>26.06.2022</a:t>
+              <a:t>27.06.2022</a:t>
             </a:fld>
             <a:endParaRPr lang="de-DE"/>
           </a:p>
@@ -5537,7 +5535,7 @@
           <a:p>
             <a:r>
               <a:rPr lang="de-DE"/>
-              <a:t>Cutting insert finder</a:t>
+              <a:t>Cutting-Insert-Finder</a:t>
             </a:r>
           </a:p>
         </p:txBody>
@@ -5797,9 +5795,9 @@
           <a:bodyPr/>
           <a:lstStyle/>
           <a:p>
-            <a:fld id="{B45AB83F-CD33-49B3-A3B3-9D7315C3C9F8}" type="datetime1">
+            <a:fld id="{FC39E9E4-C64C-4278-ADBC-6FA809D40682}" type="datetime1">
               <a:rPr lang="de-DE" smtClean="0"/>
-              <a:t>26.06.2022</a:t>
+              <a:t>27.06.2022</a:t>
             </a:fld>
             <a:endParaRPr lang="de-DE"/>
           </a:p>
@@ -5828,7 +5826,7 @@
           <a:p>
             <a:r>
               <a:rPr lang="de-DE"/>
-              <a:t>Cutting insert finder</a:t>
+              <a:t>Cutting-Insert-Finder</a:t>
             </a:r>
           </a:p>
         </p:txBody>
@@ -6041,9 +6039,9 @@
             </a:lvl1pPr>
           </a:lstStyle>
           <a:p>
-            <a:fld id="{B47B1718-975C-41CA-BFB9-54A77F6338F3}" type="datetime1">
+            <a:fld id="{5D118B75-1570-4512-AA1E-FF7B06C35143}" type="datetime1">
               <a:rPr lang="de-DE" smtClean="0"/>
-              <a:t>26.06.2022</a:t>
+              <a:t>27.06.2022</a:t>
             </a:fld>
             <a:endParaRPr lang="de-DE"/>
           </a:p>
@@ -6090,7 +6088,7 @@
           <a:p>
             <a:r>
               <a:rPr lang="de-DE"/>
-              <a:t>Cutting insert finder</a:t>
+              <a:t>Cutting-Insert-Finder</a:t>
             </a:r>
           </a:p>
         </p:txBody>
@@ -6163,7 +6161,7 @@
     <p:sldLayoutId id="2147483658" r:id="rId10"/>
     <p:sldLayoutId id="2147483659" r:id="rId11"/>
   </p:sldLayoutIdLst>
-  <p:hf sldNum="0" hdr="0" dt="0"/>
+  <p:hf hdr="0" dt="0"/>
   <p:txStyles>
     <p:titleStyle>
       <a:lvl1pPr algn="l" defTabSz="914400" rtl="0" eaLnBrk="1" latinLnBrk="0" hangingPunct="1">
@@ -6613,9 +6611,9 @@
             </a:lvl1pPr>
           </a:lstStyle>
           <a:p>
-            <a:fld id="{AB7B929A-F7FF-4438-BEDA-534F25D9447E}" type="datetime1">
+            <a:fld id="{A4DE6077-5052-47BC-9F80-6E92E1711389}" type="datetime1">
               <a:rPr lang="de-DE" smtClean="0"/>
-              <a:t>26.06.2022</a:t>
+              <a:t>27.06.2022</a:t>
             </a:fld>
             <a:endParaRPr lang="de-DE"/>
           </a:p>
@@ -6662,7 +6660,7 @@
           <a:p>
             <a:r>
               <a:rPr lang="de-DE"/>
-              <a:t>Cutting insert finder</a:t>
+              <a:t>Cutting-Insert-Finder</a:t>
             </a:r>
           </a:p>
         </p:txBody>
@@ -6735,7 +6733,7 @@
     <p:sldLayoutId id="2147483670" r:id="rId10"/>
     <p:sldLayoutId id="2147483671" r:id="rId11"/>
   </p:sldLayoutIdLst>
-  <p:hf sldNum="0" hdr="0" dt="0"/>
+  <p:hf hdr="0" dt="0"/>
   <p:txStyles>
     <p:titleStyle>
       <a:lvl1pPr algn="l" defTabSz="914400" rtl="0" eaLnBrk="1" latinLnBrk="0" hangingPunct="1">
@@ -7486,8 +7484,8 @@
           <a:p>
             <a:pPr algn="l"/>
             <a:r>
-              <a:rPr lang="de-DE" sz="5400"/>
-              <a:t>Cutting insert finder</a:t>
+              <a:rPr lang="de-DE" sz="5400" dirty="0"/>
+              <a:t>Cutting-Insert-Finder</a:t>
             </a:r>
           </a:p>
         </p:txBody>
@@ -7511,7 +7509,7 @@
         <p:spPr>
           <a:xfrm>
             <a:off x="804671" y="2724912"/>
-            <a:ext cx="3376711" cy="1155525"/>
+            <a:ext cx="3543394" cy="1155525"/>
           </a:xfrm>
         </p:spPr>
         <p:txBody>
@@ -7530,7 +7528,15 @@
             </a:br>
             <a:r>
               <a:rPr lang="de-DE" sz="1700" dirty="0"/>
-              <a:t>DV Projekt SS 2022 bei Herrn Jäger</a:t>
+              <a:t>DV Projekt </a:t>
+            </a:r>
+            <a:r>
+              <a:rPr lang="de-DE" sz="1700" dirty="0" err="1"/>
+              <a:t>SoSe</a:t>
+            </a:r>
+            <a:r>
+              <a:rPr lang="de-DE" sz="1700" dirty="0"/>
+              <a:t> 2022 bei Herrn Jäger</a:t>
             </a:r>
           </a:p>
         </p:txBody>
@@ -7567,10 +7573,39 @@
       </p:pic>
       <p:sp>
         <p:nvSpPr>
-          <p:cNvPr id="7" name="Fußzeilenplatzhalter 6">
-            <a:extLst>
-              <a:ext uri="{FF2B5EF4-FFF2-40B4-BE49-F238E27FC236}">
-                <a16:creationId xmlns:a16="http://schemas.microsoft.com/office/drawing/2014/main" id="{B52AEE9C-D82C-05AF-8C9C-71B7DBA5FF94}"/>
+          <p:cNvPr id="4" name="Foliennummernplatzhalter 3">
+            <a:extLst>
+              <a:ext uri="{FF2B5EF4-FFF2-40B4-BE49-F238E27FC236}">
+                <a16:creationId xmlns:a16="http://schemas.microsoft.com/office/drawing/2014/main" id="{ACFFD1A5-B55E-68A3-C60A-5F35D67B842B}"/>
+              </a:ext>
+            </a:extLst>
+          </p:cNvPr>
+          <p:cNvSpPr>
+            <a:spLocks noGrp="1"/>
+          </p:cNvSpPr>
+          <p:nvPr>
+            <p:ph type="sldNum" sz="quarter" idx="12"/>
+          </p:nvPr>
+        </p:nvSpPr>
+        <p:spPr/>
+        <p:txBody>
+          <a:bodyPr/>
+          <a:lstStyle/>
+          <a:p>
+            <a:fld id="{583B8968-6D66-415B-8179-7852D1E14363}" type="slidenum">
+              <a:rPr lang="de-DE" smtClean="0"/>
+              <a:t>1</a:t>
+            </a:fld>
+            <a:endParaRPr lang="de-DE"/>
+          </a:p>
+        </p:txBody>
+      </p:sp>
+      <p:sp>
+        <p:nvSpPr>
+          <p:cNvPr id="8" name="Fußzeilenplatzhalter 7">
+            <a:extLst>
+              <a:ext uri="{FF2B5EF4-FFF2-40B4-BE49-F238E27FC236}">
+                <a16:creationId xmlns:a16="http://schemas.microsoft.com/office/drawing/2014/main" id="{558FF724-4F48-C6FF-5C1D-1C1C3DCFDEC9}"/>
               </a:ext>
             </a:extLst>
           </p:cNvPr>
@@ -7588,7 +7623,7 @@
           <a:p>
             <a:r>
               <a:rPr lang="de-DE"/>
-              <a:t>Cutting insert finder</a:t>
+              <a:t>Cutting-Insert-Finder</a:t>
             </a:r>
           </a:p>
         </p:txBody>
@@ -7648,7 +7683,7 @@
           <a:p>
             <a:r>
               <a:rPr lang="de-DE" dirty="0"/>
-              <a:t>Testmöglichkeiten in der Datenbankverbindung</a:t>
+              <a:t>Datenbankverwaltung</a:t>
             </a:r>
           </a:p>
         </p:txBody>
@@ -7673,6 +7708,18 @@
         <p:txBody>
           <a:bodyPr/>
           <a:lstStyle/>
+          <a:p>
+            <a:pPr marL="0" indent="0">
+              <a:buNone/>
+            </a:pPr>
+            <a:r>
+              <a:rPr lang="de-DE" dirty="0"/>
+              <a:t>Testmöglichkeiten:</a:t>
+            </a:r>
+          </a:p>
+          <a:p>
+            <a:endParaRPr lang="de-DE" dirty="0"/>
+          </a:p>
           <a:p>
             <a:r>
               <a:rPr lang="de-DE" dirty="0"/>
@@ -7732,10 +7779,40 @@
       </p:sp>
       <p:sp>
         <p:nvSpPr>
-          <p:cNvPr id="4" name="Fußzeilenplatzhalter 3">
-            <a:extLst>
-              <a:ext uri="{FF2B5EF4-FFF2-40B4-BE49-F238E27FC236}">
-                <a16:creationId xmlns:a16="http://schemas.microsoft.com/office/drawing/2014/main" id="{2192F63E-F46F-C853-C8A8-975170B2F0C6}"/>
+          <p:cNvPr id="5" name="Foliennummernplatzhalter 4">
+            <a:extLst>
+              <a:ext uri="{FF2B5EF4-FFF2-40B4-BE49-F238E27FC236}">
+                <a16:creationId xmlns:a16="http://schemas.microsoft.com/office/drawing/2014/main" id="{0C75CD6D-0580-4A12-2839-87ABDC0CAE8C}"/>
+              </a:ext>
+            </a:extLst>
+          </p:cNvPr>
+          <p:cNvSpPr>
+            <a:spLocks noGrp="1"/>
+          </p:cNvSpPr>
+          <p:nvPr>
+            <p:ph type="sldNum" sz="quarter" idx="12"/>
+          </p:nvPr>
+        </p:nvSpPr>
+        <p:spPr/>
+        <p:txBody>
+          <a:bodyPr/>
+          <a:lstStyle/>
+          <a:p>
+            <a:fld id="{A9CD8630-C3CD-46DB-BE64-8561C8456588}" type="slidenum">
+              <a:rPr lang="de-DE" smtClean="0"/>
+              <a:pPr/>
+              <a:t>10</a:t>
+            </a:fld>
+            <a:endParaRPr lang="de-DE" dirty="0"/>
+          </a:p>
+        </p:txBody>
+      </p:sp>
+      <p:sp>
+        <p:nvSpPr>
+          <p:cNvPr id="6" name="Fußzeilenplatzhalter 5">
+            <a:extLst>
+              <a:ext uri="{FF2B5EF4-FFF2-40B4-BE49-F238E27FC236}">
+                <a16:creationId xmlns:a16="http://schemas.microsoft.com/office/drawing/2014/main" id="{CF088D28-7DF4-D9F1-7AC3-6AB0AFBFAF11}"/>
               </a:ext>
             </a:extLst>
           </p:cNvPr>
@@ -7753,7 +7830,7 @@
           <a:p>
             <a:r>
               <a:rPr lang="de-DE"/>
-              <a:t>Cutting insert finder</a:t>
+              <a:t>Cutting-Insert-Finder</a:t>
             </a:r>
             <a:endParaRPr lang="de-DE" dirty="0"/>
           </a:p>
@@ -7763,6 +7840,403 @@
     <p:extLst>
       <p:ext uri="{BB962C8B-B14F-4D97-AF65-F5344CB8AC3E}">
         <p14:creationId xmlns:p14="http://schemas.microsoft.com/office/powerpoint/2010/main" val="2718895511"/>
+      </p:ext>
+    </p:extLst>
+  </p:cSld>
+  <p:clrMapOvr>
+    <a:masterClrMapping/>
+  </p:clrMapOvr>
+  <p:timing>
+    <p:tnLst>
+      <p:par>
+        <p:cTn id="1" dur="indefinite" restart="never" nodeType="tmRoot">
+          <p:childTnLst>
+            <p:seq concurrent="1" nextAc="seek">
+              <p:cTn id="2" dur="indefinite" nodeType="mainSeq">
+                <p:childTnLst>
+                  <p:par>
+                    <p:cTn id="3" fill="hold">
+                      <p:stCondLst>
+                        <p:cond delay="indefinite"/>
+                      </p:stCondLst>
+                      <p:childTnLst>
+                        <p:par>
+                          <p:cTn id="4" fill="hold">
+                            <p:stCondLst>
+                              <p:cond delay="0"/>
+                            </p:stCondLst>
+                            <p:childTnLst>
+                              <p:par>
+                                <p:cTn id="5" presetID="1" presetClass="entr" presetSubtype="0" fill="hold" grpId="0" nodeType="clickEffect">
+                                  <p:stCondLst>
+                                    <p:cond delay="0"/>
+                                  </p:stCondLst>
+                                  <p:childTnLst>
+                                    <p:set>
+                                      <p:cBhvr>
+                                        <p:cTn id="6" dur="1" fill="hold">
+                                          <p:stCondLst>
+                                            <p:cond delay="0"/>
+                                          </p:stCondLst>
+                                        </p:cTn>
+                                        <p:tgtEl>
+                                          <p:spTgt spid="3">
+                                            <p:txEl>
+                                              <p:pRg st="0" end="0"/>
+                                            </p:txEl>
+                                          </p:spTgt>
+                                        </p:tgtEl>
+                                        <p:attrNameLst>
+                                          <p:attrName>style.visibility</p:attrName>
+                                        </p:attrNameLst>
+                                      </p:cBhvr>
+                                      <p:to>
+                                        <p:strVal val="visible"/>
+                                      </p:to>
+                                    </p:set>
+                                  </p:childTnLst>
+                                </p:cTn>
+                              </p:par>
+                            </p:childTnLst>
+                          </p:cTn>
+                        </p:par>
+                      </p:childTnLst>
+                    </p:cTn>
+                  </p:par>
+                  <p:par>
+                    <p:cTn id="7" fill="hold">
+                      <p:stCondLst>
+                        <p:cond delay="indefinite"/>
+                      </p:stCondLst>
+                      <p:childTnLst>
+                        <p:par>
+                          <p:cTn id="8" fill="hold">
+                            <p:stCondLst>
+                              <p:cond delay="0"/>
+                            </p:stCondLst>
+                            <p:childTnLst>
+                              <p:par>
+                                <p:cTn id="9" presetID="1" presetClass="entr" presetSubtype="0" fill="hold" grpId="0" nodeType="clickEffect">
+                                  <p:stCondLst>
+                                    <p:cond delay="0"/>
+                                  </p:stCondLst>
+                                  <p:childTnLst>
+                                    <p:set>
+                                      <p:cBhvr>
+                                        <p:cTn id="10" dur="1" fill="hold">
+                                          <p:stCondLst>
+                                            <p:cond delay="0"/>
+                                          </p:stCondLst>
+                                        </p:cTn>
+                                        <p:tgtEl>
+                                          <p:spTgt spid="3">
+                                            <p:txEl>
+                                              <p:pRg st="2" end="2"/>
+                                            </p:txEl>
+                                          </p:spTgt>
+                                        </p:tgtEl>
+                                        <p:attrNameLst>
+                                          <p:attrName>style.visibility</p:attrName>
+                                        </p:attrNameLst>
+                                      </p:cBhvr>
+                                      <p:to>
+                                        <p:strVal val="visible"/>
+                                      </p:to>
+                                    </p:set>
+                                  </p:childTnLst>
+                                </p:cTn>
+                              </p:par>
+                            </p:childTnLst>
+                          </p:cTn>
+                        </p:par>
+                      </p:childTnLst>
+                    </p:cTn>
+                  </p:par>
+                  <p:par>
+                    <p:cTn id="11" fill="hold">
+                      <p:stCondLst>
+                        <p:cond delay="indefinite"/>
+                      </p:stCondLst>
+                      <p:childTnLst>
+                        <p:par>
+                          <p:cTn id="12" fill="hold">
+                            <p:stCondLst>
+                              <p:cond delay="0"/>
+                            </p:stCondLst>
+                            <p:childTnLst>
+                              <p:par>
+                                <p:cTn id="13" presetID="1" presetClass="entr" presetSubtype="0" fill="hold" grpId="0" nodeType="clickEffect">
+                                  <p:stCondLst>
+                                    <p:cond delay="0"/>
+                                  </p:stCondLst>
+                                  <p:childTnLst>
+                                    <p:set>
+                                      <p:cBhvr>
+                                        <p:cTn id="14" dur="1" fill="hold">
+                                          <p:stCondLst>
+                                            <p:cond delay="0"/>
+                                          </p:stCondLst>
+                                        </p:cTn>
+                                        <p:tgtEl>
+                                          <p:spTgt spid="3">
+                                            <p:txEl>
+                                              <p:pRg st="3" end="3"/>
+                                            </p:txEl>
+                                          </p:spTgt>
+                                        </p:tgtEl>
+                                        <p:attrNameLst>
+                                          <p:attrName>style.visibility</p:attrName>
+                                        </p:attrNameLst>
+                                      </p:cBhvr>
+                                      <p:to>
+                                        <p:strVal val="visible"/>
+                                      </p:to>
+                                    </p:set>
+                                  </p:childTnLst>
+                                </p:cTn>
+                              </p:par>
+                            </p:childTnLst>
+                          </p:cTn>
+                        </p:par>
+                      </p:childTnLst>
+                    </p:cTn>
+                  </p:par>
+                  <p:par>
+                    <p:cTn id="15" fill="hold">
+                      <p:stCondLst>
+                        <p:cond delay="indefinite"/>
+                      </p:stCondLst>
+                      <p:childTnLst>
+                        <p:par>
+                          <p:cTn id="16" fill="hold">
+                            <p:stCondLst>
+                              <p:cond delay="0"/>
+                            </p:stCondLst>
+                            <p:childTnLst>
+                              <p:par>
+                                <p:cTn id="17" presetID="1" presetClass="entr" presetSubtype="0" fill="hold" grpId="0" nodeType="clickEffect">
+                                  <p:stCondLst>
+                                    <p:cond delay="0"/>
+                                  </p:stCondLst>
+                                  <p:childTnLst>
+                                    <p:set>
+                                      <p:cBhvr>
+                                        <p:cTn id="18" dur="1" fill="hold">
+                                          <p:stCondLst>
+                                            <p:cond delay="0"/>
+                                          </p:stCondLst>
+                                        </p:cTn>
+                                        <p:tgtEl>
+                                          <p:spTgt spid="3">
+                                            <p:txEl>
+                                              <p:pRg st="4" end="4"/>
+                                            </p:txEl>
+                                          </p:spTgt>
+                                        </p:tgtEl>
+                                        <p:attrNameLst>
+                                          <p:attrName>style.visibility</p:attrName>
+                                        </p:attrNameLst>
+                                      </p:cBhvr>
+                                      <p:to>
+                                        <p:strVal val="visible"/>
+                                      </p:to>
+                                    </p:set>
+                                  </p:childTnLst>
+                                </p:cTn>
+                              </p:par>
+                            </p:childTnLst>
+                          </p:cTn>
+                        </p:par>
+                      </p:childTnLst>
+                    </p:cTn>
+                  </p:par>
+                </p:childTnLst>
+              </p:cTn>
+              <p:prevCondLst>
+                <p:cond evt="onPrev" delay="0">
+                  <p:tgtEl>
+                    <p:sldTgt/>
+                  </p:tgtEl>
+                </p:cond>
+              </p:prevCondLst>
+              <p:nextCondLst>
+                <p:cond evt="onNext" delay="0">
+                  <p:tgtEl>
+                    <p:sldTgt/>
+                  </p:tgtEl>
+                </p:cond>
+              </p:nextCondLst>
+            </p:seq>
+          </p:childTnLst>
+        </p:cTn>
+      </p:par>
+    </p:tnLst>
+    <p:bldLst>
+      <p:bldP spid="3" grpId="0" build="p"/>
+    </p:bldLst>
+  </p:timing>
+</p:sld>
+</file>
+
+<file path=ppt/slides/slide11.xml><?xml version="1.0" encoding="utf-8"?>
+<p:sld xmlns:a="http://schemas.openxmlformats.org/drawingml/2006/main" xmlns:r="http://schemas.openxmlformats.org/officeDocument/2006/relationships" xmlns:p="http://schemas.openxmlformats.org/presentationml/2006/main">
+  <p:cSld>
+    <p:spTree>
+      <p:nvGrpSpPr>
+        <p:cNvPr id="1" name=""/>
+        <p:cNvGrpSpPr/>
+        <p:nvPr/>
+      </p:nvGrpSpPr>
+      <p:grpSpPr>
+        <a:xfrm>
+          <a:off x="0" y="0"/>
+          <a:ext cx="0" cy="0"/>
+          <a:chOff x="0" y="0"/>
+          <a:chExt cx="0" cy="0"/>
+        </a:xfrm>
+      </p:grpSpPr>
+      <p:sp>
+        <p:nvSpPr>
+          <p:cNvPr id="2" name="Titel 1">
+            <a:extLst>
+              <a:ext uri="{FF2B5EF4-FFF2-40B4-BE49-F238E27FC236}">
+                <a16:creationId xmlns:a16="http://schemas.microsoft.com/office/drawing/2014/main" id="{1921C20F-BAF2-0EBB-9DF5-BDA9C5A3B0B3}"/>
+              </a:ext>
+            </a:extLst>
+          </p:cNvPr>
+          <p:cNvSpPr>
+            <a:spLocks noGrp="1"/>
+          </p:cNvSpPr>
+          <p:nvPr>
+            <p:ph type="title"/>
+          </p:nvPr>
+        </p:nvSpPr>
+        <p:spPr/>
+        <p:txBody>
+          <a:bodyPr/>
+          <a:lstStyle/>
+          <a:p>
+            <a:r>
+              <a:rPr lang="de-DE" dirty="0"/>
+              <a:t>Fazit</a:t>
+            </a:r>
+          </a:p>
+        </p:txBody>
+      </p:sp>
+      <p:sp>
+        <p:nvSpPr>
+          <p:cNvPr id="3" name="Inhaltsplatzhalter 2">
+            <a:extLst>
+              <a:ext uri="{FF2B5EF4-FFF2-40B4-BE49-F238E27FC236}">
+                <a16:creationId xmlns:a16="http://schemas.microsoft.com/office/drawing/2014/main" id="{2E179F26-AB31-D0C5-9255-11410232E8BF}"/>
+              </a:ext>
+            </a:extLst>
+          </p:cNvPr>
+          <p:cNvSpPr>
+            <a:spLocks noGrp="1"/>
+          </p:cNvSpPr>
+          <p:nvPr>
+            <p:ph idx="1"/>
+          </p:nvPr>
+        </p:nvSpPr>
+        <p:spPr/>
+        <p:txBody>
+          <a:bodyPr>
+            <a:normAutofit/>
+          </a:bodyPr>
+          <a:lstStyle/>
+          <a:p>
+            <a:r>
+              <a:rPr lang="de-DE" dirty="0"/>
+              <a:t>Praktisch anwendbar</a:t>
+            </a:r>
+          </a:p>
+          <a:p>
+            <a:r>
+              <a:rPr lang="de-DE" dirty="0"/>
+              <a:t>Grafikprogrammierung kann in Zukunft in anderen Projekten verwendet werden</a:t>
+            </a:r>
+          </a:p>
+          <a:p>
+            <a:r>
+              <a:rPr lang="de-DE" dirty="0"/>
+              <a:t>Verwendung von GitHub</a:t>
+            </a:r>
+          </a:p>
+          <a:p>
+            <a:endParaRPr lang="de-DE" dirty="0"/>
+          </a:p>
+          <a:p>
+            <a:pPr marL="0" indent="0">
+              <a:buNone/>
+            </a:pPr>
+            <a:endParaRPr lang="de-DE" dirty="0"/>
+          </a:p>
+        </p:txBody>
+      </p:sp>
+      <p:sp>
+        <p:nvSpPr>
+          <p:cNvPr id="5" name="Foliennummernplatzhalter 4">
+            <a:extLst>
+              <a:ext uri="{FF2B5EF4-FFF2-40B4-BE49-F238E27FC236}">
+                <a16:creationId xmlns:a16="http://schemas.microsoft.com/office/drawing/2014/main" id="{6FE61BB5-6CA3-2198-C811-EEBE7C5CF53E}"/>
+              </a:ext>
+            </a:extLst>
+          </p:cNvPr>
+          <p:cNvSpPr>
+            <a:spLocks noGrp="1"/>
+          </p:cNvSpPr>
+          <p:nvPr>
+            <p:ph type="sldNum" sz="quarter" idx="12"/>
+          </p:nvPr>
+        </p:nvSpPr>
+        <p:spPr/>
+        <p:txBody>
+          <a:bodyPr/>
+          <a:lstStyle/>
+          <a:p>
+            <a:fld id="{A9CD8630-C3CD-46DB-BE64-8561C8456588}" type="slidenum">
+              <a:rPr lang="de-DE" smtClean="0"/>
+              <a:pPr/>
+              <a:t>11</a:t>
+            </a:fld>
+            <a:endParaRPr lang="de-DE" dirty="0"/>
+          </a:p>
+        </p:txBody>
+      </p:sp>
+      <p:sp>
+        <p:nvSpPr>
+          <p:cNvPr id="6" name="Fußzeilenplatzhalter 5">
+            <a:extLst>
+              <a:ext uri="{FF2B5EF4-FFF2-40B4-BE49-F238E27FC236}">
+                <a16:creationId xmlns:a16="http://schemas.microsoft.com/office/drawing/2014/main" id="{7101F630-D760-76B2-4AE3-6CA086CE9241}"/>
+              </a:ext>
+            </a:extLst>
+          </p:cNvPr>
+          <p:cNvSpPr>
+            <a:spLocks noGrp="1"/>
+          </p:cNvSpPr>
+          <p:nvPr>
+            <p:ph type="ftr" sz="quarter" idx="11"/>
+          </p:nvPr>
+        </p:nvSpPr>
+        <p:spPr/>
+        <p:txBody>
+          <a:bodyPr/>
+          <a:lstStyle/>
+          <a:p>
+            <a:r>
+              <a:rPr lang="de-DE"/>
+              <a:t>Cutting-Insert-Finder</a:t>
+            </a:r>
+            <a:endParaRPr lang="de-DE" dirty="0"/>
+          </a:p>
+        </p:txBody>
+      </p:sp>
+    </p:spTree>
+    <p:extLst>
+      <p:ext uri="{BB962C8B-B14F-4D97-AF65-F5344CB8AC3E}">
+        <p14:creationId xmlns:p14="http://schemas.microsoft.com/office/powerpoint/2010/main" val="1012271886"/>
       </p:ext>
     </p:extLst>
   </p:cSld>
@@ -7952,272 +8426,6 @@
 </p:sld>
 </file>
 
-<file path=ppt/slides/slide11.xml><?xml version="1.0" encoding="utf-8"?>
-<p:sld xmlns:a="http://schemas.openxmlformats.org/drawingml/2006/main" xmlns:r="http://schemas.openxmlformats.org/officeDocument/2006/relationships" xmlns:p="http://schemas.openxmlformats.org/presentationml/2006/main">
-  <p:cSld>
-    <p:spTree>
-      <p:nvGrpSpPr>
-        <p:cNvPr id="1" name=""/>
-        <p:cNvGrpSpPr/>
-        <p:nvPr/>
-      </p:nvGrpSpPr>
-      <p:grpSpPr>
-        <a:xfrm>
-          <a:off x="0" y="0"/>
-          <a:ext cx="0" cy="0"/>
-          <a:chOff x="0" y="0"/>
-          <a:chExt cx="0" cy="0"/>
-        </a:xfrm>
-      </p:grpSpPr>
-      <p:sp>
-        <p:nvSpPr>
-          <p:cNvPr id="2" name="Titel 1">
-            <a:extLst>
-              <a:ext uri="{FF2B5EF4-FFF2-40B4-BE49-F238E27FC236}">
-                <a16:creationId xmlns:a16="http://schemas.microsoft.com/office/drawing/2014/main" id="{0CE141FE-3C65-1F46-2DFF-F8472736D1FA}"/>
-              </a:ext>
-            </a:extLst>
-          </p:cNvPr>
-          <p:cNvSpPr>
-            <a:spLocks noGrp="1"/>
-          </p:cNvSpPr>
-          <p:nvPr>
-            <p:ph type="title"/>
-          </p:nvPr>
-        </p:nvSpPr>
-        <p:spPr/>
-        <p:txBody>
-          <a:bodyPr/>
-          <a:lstStyle/>
-          <a:p>
-            <a:r>
-              <a:rPr lang="de-DE" dirty="0"/>
-              <a:t>Problemlösungen</a:t>
-            </a:r>
-          </a:p>
-        </p:txBody>
-      </p:sp>
-      <p:sp>
-        <p:nvSpPr>
-          <p:cNvPr id="3" name="Inhaltsplatzhalter 2">
-            <a:extLst>
-              <a:ext uri="{FF2B5EF4-FFF2-40B4-BE49-F238E27FC236}">
-                <a16:creationId xmlns:a16="http://schemas.microsoft.com/office/drawing/2014/main" id="{FAB5BB3C-6334-B18C-420A-628A395912CD}"/>
-              </a:ext>
-            </a:extLst>
-          </p:cNvPr>
-          <p:cNvSpPr>
-            <a:spLocks noGrp="1"/>
-          </p:cNvSpPr>
-          <p:nvPr>
-            <p:ph idx="1"/>
-          </p:nvPr>
-        </p:nvSpPr>
-        <p:spPr/>
-        <p:txBody>
-          <a:bodyPr/>
-          <a:lstStyle/>
-          <a:p>
-            <a:r>
-              <a:rPr lang="de-DE" dirty="0"/>
-              <a:t>Fehlermeldungen von </a:t>
-            </a:r>
-            <a:r>
-              <a:rPr lang="de-DE" dirty="0" err="1"/>
-              <a:t>eclipse</a:t>
-            </a:r>
-            <a:r>
-              <a:rPr lang="de-DE" dirty="0"/>
-              <a:t> durchgehen</a:t>
-            </a:r>
-          </a:p>
-          <a:p>
-            <a:r>
-              <a:rPr lang="de-DE" dirty="0"/>
-              <a:t>Im Internet nach Lösungen suchen</a:t>
-            </a:r>
-          </a:p>
-          <a:p>
-            <a:endParaRPr lang="de-DE" dirty="0"/>
-          </a:p>
-          <a:p>
-            <a:endParaRPr lang="de-DE" dirty="0"/>
-          </a:p>
-        </p:txBody>
-      </p:sp>
-      <p:sp>
-        <p:nvSpPr>
-          <p:cNvPr id="4" name="Fußzeilenplatzhalter 3">
-            <a:extLst>
-              <a:ext uri="{FF2B5EF4-FFF2-40B4-BE49-F238E27FC236}">
-                <a16:creationId xmlns:a16="http://schemas.microsoft.com/office/drawing/2014/main" id="{73742868-12C9-7EB9-6D52-811A76DC1108}"/>
-              </a:ext>
-            </a:extLst>
-          </p:cNvPr>
-          <p:cNvSpPr>
-            <a:spLocks noGrp="1"/>
-          </p:cNvSpPr>
-          <p:nvPr>
-            <p:ph type="ftr" sz="quarter" idx="11"/>
-          </p:nvPr>
-        </p:nvSpPr>
-        <p:spPr/>
-        <p:txBody>
-          <a:bodyPr/>
-          <a:lstStyle/>
-          <a:p>
-            <a:r>
-              <a:rPr lang="de-DE"/>
-              <a:t>Cutting insert finder</a:t>
-            </a:r>
-            <a:endParaRPr lang="de-DE" dirty="0"/>
-          </a:p>
-        </p:txBody>
-      </p:sp>
-    </p:spTree>
-    <p:extLst>
-      <p:ext uri="{BB962C8B-B14F-4D97-AF65-F5344CB8AC3E}">
-        <p14:creationId xmlns:p14="http://schemas.microsoft.com/office/powerpoint/2010/main" val="592553862"/>
-      </p:ext>
-    </p:extLst>
-  </p:cSld>
-  <p:clrMapOvr>
-    <a:masterClrMapping/>
-  </p:clrMapOvr>
-  <p:timing>
-    <p:tnLst>
-      <p:par>
-        <p:cTn id="1" dur="indefinite" restart="never" nodeType="tmRoot">
-          <p:childTnLst>
-            <p:seq concurrent="1" nextAc="seek">
-              <p:cTn id="2" dur="indefinite" nodeType="mainSeq">
-                <p:childTnLst>
-                  <p:par>
-                    <p:cTn id="3" fill="hold">
-                      <p:stCondLst>
-                        <p:cond delay="indefinite"/>
-                      </p:stCondLst>
-                      <p:childTnLst>
-                        <p:par>
-                          <p:cTn id="4" fill="hold">
-                            <p:stCondLst>
-                              <p:cond delay="0"/>
-                            </p:stCondLst>
-                            <p:childTnLst>
-                              <p:par>
-                                <p:cTn id="5" presetID="1" presetClass="entr" presetSubtype="0" fill="hold" grpId="0" nodeType="clickEffect">
-                                  <p:stCondLst>
-                                    <p:cond delay="0"/>
-                                  </p:stCondLst>
-                                  <p:childTnLst>
-                                    <p:set>
-                                      <p:cBhvr>
-                                        <p:cTn id="6" dur="1" fill="hold">
-                                          <p:stCondLst>
-                                            <p:cond delay="0"/>
-                                          </p:stCondLst>
-                                        </p:cTn>
-                                        <p:tgtEl>
-                                          <p:spTgt spid="3">
-                                            <p:txEl>
-                                              <p:pRg st="0" end="0"/>
-                                            </p:txEl>
-                                          </p:spTgt>
-                                        </p:tgtEl>
-                                        <p:attrNameLst>
-                                          <p:attrName>style.visibility</p:attrName>
-                                        </p:attrNameLst>
-                                      </p:cBhvr>
-                                      <p:to>
-                                        <p:strVal val="visible"/>
-                                      </p:to>
-                                    </p:set>
-                                  </p:childTnLst>
-                                </p:cTn>
-                              </p:par>
-                            </p:childTnLst>
-                          </p:cTn>
-                        </p:par>
-                      </p:childTnLst>
-                    </p:cTn>
-                  </p:par>
-                  <p:par>
-                    <p:cTn id="7" fill="hold">
-                      <p:stCondLst>
-                        <p:cond delay="indefinite"/>
-                      </p:stCondLst>
-                      <p:childTnLst>
-                        <p:par>
-                          <p:cTn id="8" fill="hold">
-                            <p:stCondLst>
-                              <p:cond delay="0"/>
-                            </p:stCondLst>
-                            <p:childTnLst>
-                              <p:par>
-                                <p:cTn id="9" presetID="1" presetClass="entr" presetSubtype="0" fill="hold" grpId="0" nodeType="clickEffect">
-                                  <p:stCondLst>
-                                    <p:cond delay="0"/>
-                                  </p:stCondLst>
-                                  <p:childTnLst>
-                                    <p:set>
-                                      <p:cBhvr>
-                                        <p:cTn id="10" dur="1" fill="hold">
-                                          <p:stCondLst>
-                                            <p:cond delay="0"/>
-                                          </p:stCondLst>
-                                        </p:cTn>
-                                        <p:tgtEl>
-                                          <p:spTgt spid="3">
-                                            <p:txEl>
-                                              <p:pRg st="1" end="1"/>
-                                            </p:txEl>
-                                          </p:spTgt>
-                                        </p:tgtEl>
-                                        <p:attrNameLst>
-                                          <p:attrName>style.visibility</p:attrName>
-                                        </p:attrNameLst>
-                                      </p:cBhvr>
-                                      <p:to>
-                                        <p:strVal val="visible"/>
-                                      </p:to>
-                                    </p:set>
-                                  </p:childTnLst>
-                                </p:cTn>
-                              </p:par>
-                            </p:childTnLst>
-                          </p:cTn>
-                        </p:par>
-                      </p:childTnLst>
-                    </p:cTn>
-                  </p:par>
-                </p:childTnLst>
-              </p:cTn>
-              <p:prevCondLst>
-                <p:cond evt="onPrev" delay="0">
-                  <p:tgtEl>
-                    <p:sldTgt/>
-                  </p:tgtEl>
-                </p:cond>
-              </p:prevCondLst>
-              <p:nextCondLst>
-                <p:cond evt="onNext" delay="0">
-                  <p:tgtEl>
-                    <p:sldTgt/>
-                  </p:tgtEl>
-                </p:cond>
-              </p:nextCondLst>
-            </p:seq>
-          </p:childTnLst>
-        </p:cTn>
-      </p:par>
-    </p:tnLst>
-    <p:bldLst>
-      <p:bldP spid="3" grpId="0" build="p"/>
-    </p:bldLst>
-  </p:timing>
-</p:sld>
-</file>
-
 <file path=ppt/slides/slide12.xml><?xml version="1.0" encoding="utf-8"?>
 <p:sld xmlns:a="http://schemas.openxmlformats.org/drawingml/2006/main" xmlns:r="http://schemas.openxmlformats.org/officeDocument/2006/relationships" xmlns:p="http://schemas.openxmlformats.org/presentationml/2006/main">
   <p:cSld>
@@ -8240,7 +8448,7 @@
           <p:cNvPr id="2" name="Titel 1">
             <a:extLst>
               <a:ext uri="{FF2B5EF4-FFF2-40B4-BE49-F238E27FC236}">
-                <a16:creationId xmlns:a16="http://schemas.microsoft.com/office/drawing/2014/main" id="{1921C20F-BAF2-0EBB-9DF5-BDA9C5A3B0B3}"/>
+                <a16:creationId xmlns:a16="http://schemas.microsoft.com/office/drawing/2014/main" id="{E9845A31-2536-82E2-A974-C62122AC38D0}"/>
               </a:ext>
             </a:extLst>
           </p:cNvPr>
@@ -8257,9 +8465,10 @@
           <a:lstStyle/>
           <a:p>
             <a:r>
-              <a:rPr lang="de-DE" dirty="0"/>
-              <a:t>Fazit und Verbesserungsvorschläge</a:t>
-            </a:r>
+              <a:rPr lang="de-DE"/>
+              <a:t>Verbesserungsvorschläge</a:t>
+            </a:r>
+            <a:endParaRPr lang="de-DE" dirty="0"/>
           </a:p>
         </p:txBody>
       </p:sp>
@@ -8268,7 +8477,7 @@
           <p:cNvPr id="3" name="Inhaltsplatzhalter 2">
             <a:extLst>
               <a:ext uri="{FF2B5EF4-FFF2-40B4-BE49-F238E27FC236}">
-                <a16:creationId xmlns:a16="http://schemas.microsoft.com/office/drawing/2014/main" id="{2E179F26-AB31-D0C5-9255-11410232E8BF}"/>
+                <a16:creationId xmlns:a16="http://schemas.microsoft.com/office/drawing/2014/main" id="{5D190364-C094-0B09-69BD-185E1995F764}"/>
               </a:ext>
             </a:extLst>
           </p:cNvPr>
@@ -8285,10 +8494,25 @@
           <a:lstStyle/>
           <a:p>
             <a:r>
-              <a:rPr lang="de-DE" dirty="0"/>
+              <a:rPr lang="de-DE"/>
+              <a:t>Grafische Oberfläche von Anfang an mit Layout-Manager programmieren</a:t>
+            </a:r>
+          </a:p>
+          <a:p>
+            <a:r>
+              <a:rPr lang="de-DE"/>
               <a:t>Klassen sollten vor der Zusammenführung besser aufeinander abgestimmt werden</a:t>
             </a:r>
           </a:p>
+          <a:p>
+            <a:r>
+              <a:rPr lang="de-DE"/>
+              <a:t>JavaDoc Kommentare während Programmerstellung erstellen</a:t>
+            </a:r>
+          </a:p>
+          <a:p>
+            <a:endParaRPr lang="de-DE" dirty="0"/>
+          </a:p>
         </p:txBody>
       </p:sp>
       <p:sp>
@@ -8296,7 +8520,7 @@
           <p:cNvPr id="4" name="Fußzeilenplatzhalter 3">
             <a:extLst>
               <a:ext uri="{FF2B5EF4-FFF2-40B4-BE49-F238E27FC236}">
-                <a16:creationId xmlns:a16="http://schemas.microsoft.com/office/drawing/2014/main" id="{55108A04-22C5-B992-1CA4-EB665E540C19}"/>
+                <a16:creationId xmlns:a16="http://schemas.microsoft.com/office/drawing/2014/main" id="{B77CF8A2-AA70-3982-6B62-DC1F8EDBFE6B}"/>
               </a:ext>
             </a:extLst>
           </p:cNvPr>
@@ -8314,104 +8538,81 @@
           <a:p>
             <a:r>
               <a:rPr lang="de-DE"/>
-              <a:t>Cutting insert finder</a:t>
+              <a:t>Cutting-Insert-Finder</a:t>
             </a:r>
             <a:endParaRPr lang="de-DE" dirty="0"/>
           </a:p>
         </p:txBody>
       </p:sp>
+      <p:sp>
+        <p:nvSpPr>
+          <p:cNvPr id="5" name="Foliennummernplatzhalter 4">
+            <a:extLst>
+              <a:ext uri="{FF2B5EF4-FFF2-40B4-BE49-F238E27FC236}">
+                <a16:creationId xmlns:a16="http://schemas.microsoft.com/office/drawing/2014/main" id="{D6FC999D-BFDE-4FCA-486A-095B04505066}"/>
+              </a:ext>
+            </a:extLst>
+          </p:cNvPr>
+          <p:cNvSpPr>
+            <a:spLocks noGrp="1"/>
+          </p:cNvSpPr>
+          <p:nvPr>
+            <p:ph type="sldNum" sz="quarter" idx="12"/>
+          </p:nvPr>
+        </p:nvSpPr>
+        <p:spPr/>
+        <p:txBody>
+          <a:bodyPr/>
+          <a:lstStyle/>
+          <a:p>
+            <a:fld id="{A9CD8630-C3CD-46DB-BE64-8561C8456588}" type="slidenum">
+              <a:rPr lang="de-DE" smtClean="0"/>
+              <a:pPr/>
+              <a:t>12</a:t>
+            </a:fld>
+            <a:endParaRPr lang="de-DE" dirty="0"/>
+          </a:p>
+        </p:txBody>
+      </p:sp>
+      <p:pic>
+        <p:nvPicPr>
+          <p:cNvPr id="6" name="Grafik 5">
+            <a:extLst>
+              <a:ext uri="{FF2B5EF4-FFF2-40B4-BE49-F238E27FC236}">
+                <a16:creationId xmlns:a16="http://schemas.microsoft.com/office/drawing/2014/main" id="{76894295-1C67-B82A-55C1-B44269A22634}"/>
+              </a:ext>
+            </a:extLst>
+          </p:cNvPr>
+          <p:cNvPicPr>
+            <a:picLocks noChangeAspect="1"/>
+          </p:cNvPicPr>
+          <p:nvPr/>
+        </p:nvPicPr>
+        <p:blipFill rotWithShape="1">
+          <a:blip r:embed="rId2"/>
+          <a:srcRect l="15528" t="24652" r="10798" b="20109"/>
+          <a:stretch/>
+        </p:blipFill>
+        <p:spPr>
+          <a:xfrm>
+            <a:off x="8153400" y="1027906"/>
+            <a:ext cx="3510854" cy="4682007"/>
+          </a:xfrm>
+          <a:prstGeom prst="rect">
+            <a:avLst/>
+          </a:prstGeom>
+        </p:spPr>
+      </p:pic>
     </p:spTree>
     <p:extLst>
       <p:ext uri="{BB962C8B-B14F-4D97-AF65-F5344CB8AC3E}">
-        <p14:creationId xmlns:p14="http://schemas.microsoft.com/office/powerpoint/2010/main" val="1012271886"/>
+        <p14:creationId xmlns:p14="http://schemas.microsoft.com/office/powerpoint/2010/main" val="1564192934"/>
       </p:ext>
     </p:extLst>
   </p:cSld>
   <p:clrMapOvr>
     <a:masterClrMapping/>
   </p:clrMapOvr>
-  <p:timing>
-    <p:tnLst>
-      <p:par>
-        <p:cTn id="1" dur="indefinite" restart="never" nodeType="tmRoot">
-          <p:childTnLst>
-            <p:seq concurrent="1" nextAc="seek">
-              <p:cTn id="2" dur="indefinite" nodeType="mainSeq">
-                <p:childTnLst>
-                  <p:par>
-                    <p:cTn id="3" fill="hold">
-                      <p:stCondLst>
-                        <p:cond delay="indefinite"/>
-                      </p:stCondLst>
-                      <p:childTnLst>
-                        <p:par>
-                          <p:cTn id="4" fill="hold">
-                            <p:stCondLst>
-                              <p:cond delay="0"/>
-                            </p:stCondLst>
-                            <p:childTnLst>
-                              <p:par>
-                                <p:cTn id="5" presetID="1" presetClass="entr" presetSubtype="0" fill="hold" grpId="0" nodeType="clickEffect">
-                                  <p:stCondLst>
-                                    <p:cond delay="0"/>
-                                  </p:stCondLst>
-                                  <p:childTnLst>
-                                    <p:set>
-                                      <p:cBhvr>
-                                        <p:cTn id="6" dur="1" fill="hold">
-                                          <p:stCondLst>
-                                            <p:cond delay="0"/>
-                                          </p:stCondLst>
-                                        </p:cTn>
-                                        <p:tgtEl>
-                                          <p:spTgt spid="3">
-                                            <p:txEl>
-                                              <p:pRg st="0" end="0"/>
-                                            </p:txEl>
-                                          </p:spTgt>
-                                        </p:tgtEl>
-                                        <p:attrNameLst>
-                                          <p:attrName>style.visibility</p:attrName>
-                                        </p:attrNameLst>
-                                      </p:cBhvr>
-                                      <p:to>
-                                        <p:strVal val="visible"/>
-                                      </p:to>
-                                    </p:set>
-                                  </p:childTnLst>
-                                </p:cTn>
-                              </p:par>
-                            </p:childTnLst>
-                          </p:cTn>
-                        </p:par>
-                      </p:childTnLst>
-                    </p:cTn>
-                  </p:par>
-                </p:childTnLst>
-              </p:cTn>
-              <p:prevCondLst>
-                <p:cond evt="onPrev" delay="0">
-                  <p:tgtEl>
-                    <p:sldTgt/>
-                  </p:tgtEl>
-                </p:cond>
-              </p:prevCondLst>
-              <p:nextCondLst>
-                <p:cond evt="onNext" delay="0">
-                  <p:tgtEl>
-                    <p:sldTgt/>
-                  </p:tgtEl>
-                </p:cond>
-              </p:nextCondLst>
-            </p:seq>
-          </p:childTnLst>
-        </p:cTn>
-      </p:par>
-    </p:tnLst>
-    <p:bldLst>
-      <p:bldP spid="3" grpId="0" build="p"/>
-    </p:bldLst>
-  </p:timing>
 </p:sld>
 </file>
 
@@ -8499,10 +8700,40 @@
       </p:sp>
       <p:sp>
         <p:nvSpPr>
-          <p:cNvPr id="4" name="Fußzeilenplatzhalter 3">
-            <a:extLst>
-              <a:ext uri="{FF2B5EF4-FFF2-40B4-BE49-F238E27FC236}">
-                <a16:creationId xmlns:a16="http://schemas.microsoft.com/office/drawing/2014/main" id="{1FDD17C0-024C-15EA-1844-53811039C2F0}"/>
+          <p:cNvPr id="5" name="Foliennummernplatzhalter 4">
+            <a:extLst>
+              <a:ext uri="{FF2B5EF4-FFF2-40B4-BE49-F238E27FC236}">
+                <a16:creationId xmlns:a16="http://schemas.microsoft.com/office/drawing/2014/main" id="{819185E5-95FD-C51F-FD39-634D1FA8D7DA}"/>
+              </a:ext>
+            </a:extLst>
+          </p:cNvPr>
+          <p:cNvSpPr>
+            <a:spLocks noGrp="1"/>
+          </p:cNvSpPr>
+          <p:nvPr>
+            <p:ph type="sldNum" sz="quarter" idx="12"/>
+          </p:nvPr>
+        </p:nvSpPr>
+        <p:spPr/>
+        <p:txBody>
+          <a:bodyPr/>
+          <a:lstStyle/>
+          <a:p>
+            <a:fld id="{A9CD8630-C3CD-46DB-BE64-8561C8456588}" type="slidenum">
+              <a:rPr lang="de-DE" smtClean="0"/>
+              <a:pPr/>
+              <a:t>13</a:t>
+            </a:fld>
+            <a:endParaRPr lang="de-DE" dirty="0"/>
+          </a:p>
+        </p:txBody>
+      </p:sp>
+      <p:sp>
+        <p:nvSpPr>
+          <p:cNvPr id="6" name="Fußzeilenplatzhalter 5">
+            <a:extLst>
+              <a:ext uri="{FF2B5EF4-FFF2-40B4-BE49-F238E27FC236}">
+                <a16:creationId xmlns:a16="http://schemas.microsoft.com/office/drawing/2014/main" id="{03A88482-BA58-E969-FE1B-0F5F44BA86A7}"/>
               </a:ext>
             </a:extLst>
           </p:cNvPr>
@@ -8520,7 +8751,7 @@
           <a:p>
             <a:r>
               <a:rPr lang="de-DE"/>
-              <a:t>Cutting insert finder</a:t>
+              <a:t>Cutting-Insert-Finder</a:t>
             </a:r>
             <a:endParaRPr lang="de-DE" dirty="0"/>
           </a:p>
@@ -8890,25 +9121,13 @@
           <a:p>
             <a:r>
               <a:rPr lang="de-DE" dirty="0"/>
-              <a:t>Problemstellungen bei der GUI Klasse</a:t>
+              <a:t>Grafische Oberfläche</a:t>
             </a:r>
           </a:p>
           <a:p>
             <a:r>
               <a:rPr lang="de-DE" dirty="0"/>
-              <a:t>Problemstellungen bei der Datenbankverbindung</a:t>
-            </a:r>
-          </a:p>
-          <a:p>
-            <a:r>
-              <a:rPr lang="de-DE" dirty="0"/>
-              <a:t>Testmöglichkeiten in der Datenbankverbindung</a:t>
-            </a:r>
-          </a:p>
-          <a:p>
-            <a:r>
-              <a:rPr lang="de-DE" dirty="0"/>
-              <a:t>Problemlösungen</a:t>
+              <a:t>Datenbankverwaltung</a:t>
             </a:r>
           </a:p>
           <a:p>
@@ -8921,10 +9140,40 @@
       </p:sp>
       <p:sp>
         <p:nvSpPr>
-          <p:cNvPr id="5" name="Fußzeilenplatzhalter 4">
-            <a:extLst>
-              <a:ext uri="{FF2B5EF4-FFF2-40B4-BE49-F238E27FC236}">
-                <a16:creationId xmlns:a16="http://schemas.microsoft.com/office/drawing/2014/main" id="{C4024458-5520-23F0-4AEE-2E9082981A57}"/>
+          <p:cNvPr id="4" name="Foliennummernplatzhalter 3">
+            <a:extLst>
+              <a:ext uri="{FF2B5EF4-FFF2-40B4-BE49-F238E27FC236}">
+                <a16:creationId xmlns:a16="http://schemas.microsoft.com/office/drawing/2014/main" id="{DBCA3221-9D26-8F4C-452D-49D892AAFE49}"/>
+              </a:ext>
+            </a:extLst>
+          </p:cNvPr>
+          <p:cNvSpPr>
+            <a:spLocks noGrp="1"/>
+          </p:cNvSpPr>
+          <p:nvPr>
+            <p:ph type="sldNum" sz="quarter" idx="12"/>
+          </p:nvPr>
+        </p:nvSpPr>
+        <p:spPr/>
+        <p:txBody>
+          <a:bodyPr/>
+          <a:lstStyle/>
+          <a:p>
+            <a:fld id="{A9CD8630-C3CD-46DB-BE64-8561C8456588}" type="slidenum">
+              <a:rPr lang="de-DE" smtClean="0"/>
+              <a:pPr/>
+              <a:t>2</a:t>
+            </a:fld>
+            <a:endParaRPr lang="de-DE" dirty="0"/>
+          </a:p>
+        </p:txBody>
+      </p:sp>
+      <p:sp>
+        <p:nvSpPr>
+          <p:cNvPr id="6" name="Fußzeilenplatzhalter 5">
+            <a:extLst>
+              <a:ext uri="{FF2B5EF4-FFF2-40B4-BE49-F238E27FC236}">
+                <a16:creationId xmlns:a16="http://schemas.microsoft.com/office/drawing/2014/main" id="{2B4EC482-ADC5-35A4-976A-E43CBEEC8A75}"/>
               </a:ext>
             </a:extLst>
           </p:cNvPr>
@@ -8942,7 +9191,7 @@
           <a:p>
             <a:r>
               <a:rPr lang="de-DE"/>
-              <a:t>Cutting insert finder</a:t>
+              <a:t>Cutting-Insert-Finder</a:t>
             </a:r>
             <a:endParaRPr lang="de-DE" dirty="0"/>
           </a:p>
@@ -9260,104 +9509,6 @@
                       </p:childTnLst>
                     </p:cTn>
                   </p:par>
-                  <p:par>
-                    <p:cTn id="27" fill="hold">
-                      <p:stCondLst>
-                        <p:cond delay="indefinite"/>
-                      </p:stCondLst>
-                      <p:childTnLst>
-                        <p:par>
-                          <p:cTn id="28" fill="hold">
-                            <p:stCondLst>
-                              <p:cond delay="0"/>
-                            </p:stCondLst>
-                            <p:childTnLst>
-                              <p:par>
-                                <p:cTn id="29" presetID="1" presetClass="entr" presetSubtype="0" fill="hold" grpId="0" nodeType="clickEffect">
-                                  <p:stCondLst>
-                                    <p:cond delay="0"/>
-                                  </p:stCondLst>
-                                  <p:childTnLst>
-                                    <p:set>
-                                      <p:cBhvr>
-                                        <p:cTn id="30" dur="1" fill="hold">
-                                          <p:stCondLst>
-                                            <p:cond delay="0"/>
-                                          </p:stCondLst>
-                                        </p:cTn>
-                                        <p:tgtEl>
-                                          <p:spTgt spid="3">
-                                            <p:txEl>
-                                              <p:pRg st="6" end="6"/>
-                                            </p:txEl>
-                                          </p:spTgt>
-                                        </p:tgtEl>
-                                        <p:attrNameLst>
-                                          <p:attrName>style.visibility</p:attrName>
-                                        </p:attrNameLst>
-                                      </p:cBhvr>
-                                      <p:to>
-                                        <p:strVal val="visible"/>
-                                      </p:to>
-                                    </p:set>
-                                  </p:childTnLst>
-                                </p:cTn>
-                              </p:par>
-                            </p:childTnLst>
-                          </p:cTn>
-                        </p:par>
-                      </p:childTnLst>
-                    </p:cTn>
-                  </p:par>
-                  <p:par>
-                    <p:cTn id="31" fill="hold">
-                      <p:stCondLst>
-                        <p:cond delay="indefinite"/>
-                      </p:stCondLst>
-                      <p:childTnLst>
-                        <p:par>
-                          <p:cTn id="32" fill="hold">
-                            <p:stCondLst>
-                              <p:cond delay="0"/>
-                            </p:stCondLst>
-                            <p:childTnLst>
-                              <p:par>
-                                <p:cTn id="33" presetID="1" presetClass="entr" presetSubtype="0" fill="hold" grpId="0" nodeType="clickEffect">
-                                  <p:stCondLst>
-                                    <p:cond delay="0"/>
-                                  </p:stCondLst>
-                                  <p:childTnLst>
-                                    <p:set>
-                                      <p:cBhvr>
-                                        <p:cTn id="34" dur="1" fill="hold">
-                                          <p:stCondLst>
-                                            <p:cond delay="0"/>
-                                          </p:stCondLst>
-                                        </p:cTn>
-                                        <p:tgtEl>
-                                          <p:spTgt spid="3">
-                                            <p:txEl>
-                                              <p:pRg st="7" end="7"/>
-                                            </p:txEl>
-                                          </p:spTgt>
-                                        </p:tgtEl>
-                                        <p:attrNameLst>
-                                          <p:attrName>style.visibility</p:attrName>
-                                        </p:attrNameLst>
-                                      </p:cBhvr>
-                                      <p:to>
-                                        <p:strVal val="visible"/>
-                                      </p:to>
-                                    </p:set>
-                                  </p:childTnLst>
-                                </p:cTn>
-                              </p:par>
-                            </p:childTnLst>
-                          </p:cTn>
-                        </p:par>
-                      </p:childTnLst>
-                    </p:cTn>
-                  </p:par>
                 </p:childTnLst>
               </p:cTn>
               <p:prevCondLst>
@@ -9479,10 +9630,40 @@
       </p:sp>
       <p:sp>
         <p:nvSpPr>
-          <p:cNvPr id="4" name="Fußzeilenplatzhalter 3">
-            <a:extLst>
-              <a:ext uri="{FF2B5EF4-FFF2-40B4-BE49-F238E27FC236}">
-                <a16:creationId xmlns:a16="http://schemas.microsoft.com/office/drawing/2014/main" id="{20A51166-2133-8DB3-23EF-18EF1A7DC15A}"/>
+          <p:cNvPr id="5" name="Foliennummernplatzhalter 4">
+            <a:extLst>
+              <a:ext uri="{FF2B5EF4-FFF2-40B4-BE49-F238E27FC236}">
+                <a16:creationId xmlns:a16="http://schemas.microsoft.com/office/drawing/2014/main" id="{28CB6AC7-ED2F-E506-D711-2BBF9B6F7C0C}"/>
+              </a:ext>
+            </a:extLst>
+          </p:cNvPr>
+          <p:cNvSpPr>
+            <a:spLocks noGrp="1"/>
+          </p:cNvSpPr>
+          <p:nvPr>
+            <p:ph type="sldNum" sz="quarter" idx="12"/>
+          </p:nvPr>
+        </p:nvSpPr>
+        <p:spPr/>
+        <p:txBody>
+          <a:bodyPr/>
+          <a:lstStyle/>
+          <a:p>
+            <a:fld id="{A9CD8630-C3CD-46DB-BE64-8561C8456588}" type="slidenum">
+              <a:rPr lang="de-DE" smtClean="0"/>
+              <a:pPr/>
+              <a:t>3</a:t>
+            </a:fld>
+            <a:endParaRPr lang="de-DE" dirty="0"/>
+          </a:p>
+        </p:txBody>
+      </p:sp>
+      <p:sp>
+        <p:nvSpPr>
+          <p:cNvPr id="6" name="Fußzeilenplatzhalter 5">
+            <a:extLst>
+              <a:ext uri="{FF2B5EF4-FFF2-40B4-BE49-F238E27FC236}">
+                <a16:creationId xmlns:a16="http://schemas.microsoft.com/office/drawing/2014/main" id="{8760AB9E-4A7F-7139-C02E-120455EB0E6F}"/>
               </a:ext>
             </a:extLst>
           </p:cNvPr>
@@ -9500,7 +9681,7 @@
           <a:p>
             <a:r>
               <a:rPr lang="de-DE"/>
-              <a:t>Cutting insert finder</a:t>
+              <a:t>Cutting-Insert-Finder</a:t>
             </a:r>
             <a:endParaRPr lang="de-DE" dirty="0"/>
           </a:p>
@@ -9853,10 +10034,40 @@
       </p:sp>
       <p:sp>
         <p:nvSpPr>
-          <p:cNvPr id="4" name="Fußzeilenplatzhalter 3">
-            <a:extLst>
-              <a:ext uri="{FF2B5EF4-FFF2-40B4-BE49-F238E27FC236}">
-                <a16:creationId xmlns:a16="http://schemas.microsoft.com/office/drawing/2014/main" id="{D5AFC806-7699-6A60-D861-D41CDADFA84E}"/>
+          <p:cNvPr id="5" name="Foliennummernplatzhalter 4">
+            <a:extLst>
+              <a:ext uri="{FF2B5EF4-FFF2-40B4-BE49-F238E27FC236}">
+                <a16:creationId xmlns:a16="http://schemas.microsoft.com/office/drawing/2014/main" id="{4B2D084B-1B76-E843-754D-C7F61D9FD451}"/>
+              </a:ext>
+            </a:extLst>
+          </p:cNvPr>
+          <p:cNvSpPr>
+            <a:spLocks noGrp="1"/>
+          </p:cNvSpPr>
+          <p:nvPr>
+            <p:ph type="sldNum" sz="quarter" idx="12"/>
+          </p:nvPr>
+        </p:nvSpPr>
+        <p:spPr/>
+        <p:txBody>
+          <a:bodyPr/>
+          <a:lstStyle/>
+          <a:p>
+            <a:fld id="{A9CD8630-C3CD-46DB-BE64-8561C8456588}" type="slidenum">
+              <a:rPr lang="de-DE" smtClean="0"/>
+              <a:pPr/>
+              <a:t>4</a:t>
+            </a:fld>
+            <a:endParaRPr lang="de-DE" dirty="0"/>
+          </a:p>
+        </p:txBody>
+      </p:sp>
+      <p:sp>
+        <p:nvSpPr>
+          <p:cNvPr id="6" name="Fußzeilenplatzhalter 5">
+            <a:extLst>
+              <a:ext uri="{FF2B5EF4-FFF2-40B4-BE49-F238E27FC236}">
+                <a16:creationId xmlns:a16="http://schemas.microsoft.com/office/drawing/2014/main" id="{032E2176-6681-9296-6C73-6C34B5FFE97D}"/>
               </a:ext>
             </a:extLst>
           </p:cNvPr>
@@ -9874,7 +10085,7 @@
           <a:p>
             <a:r>
               <a:rPr lang="de-DE"/>
-              <a:t>Cutting insert finder</a:t>
+              <a:t>Cutting-Insert-Finder</a:t>
             </a:r>
             <a:endParaRPr lang="de-DE" dirty="0"/>
           </a:p>
@@ -10286,16 +10497,46 @@
           <a:bodyPr/>
           <a:lstStyle/>
           <a:p>
-            <a:endParaRPr lang="de-DE"/>
-          </a:p>
-        </p:txBody>
-      </p:sp>
-      <p:sp>
-        <p:nvSpPr>
-          <p:cNvPr id="4" name="Fußzeilenplatzhalter 3">
-            <a:extLst>
-              <a:ext uri="{FF2B5EF4-FFF2-40B4-BE49-F238E27FC236}">
-                <a16:creationId xmlns:a16="http://schemas.microsoft.com/office/drawing/2014/main" id="{B2701710-E46B-42C2-D560-8D6070BF59AD}"/>
+            <a:endParaRPr lang="de-DE" dirty="0"/>
+          </a:p>
+        </p:txBody>
+      </p:sp>
+      <p:sp>
+        <p:nvSpPr>
+          <p:cNvPr id="5" name="Foliennummernplatzhalter 4">
+            <a:extLst>
+              <a:ext uri="{FF2B5EF4-FFF2-40B4-BE49-F238E27FC236}">
+                <a16:creationId xmlns:a16="http://schemas.microsoft.com/office/drawing/2014/main" id="{93F8F3C9-91B9-631B-6F6D-A894BF0A47E0}"/>
+              </a:ext>
+            </a:extLst>
+          </p:cNvPr>
+          <p:cNvSpPr>
+            <a:spLocks noGrp="1"/>
+          </p:cNvSpPr>
+          <p:nvPr>
+            <p:ph type="sldNum" sz="quarter" idx="12"/>
+          </p:nvPr>
+        </p:nvSpPr>
+        <p:spPr/>
+        <p:txBody>
+          <a:bodyPr/>
+          <a:lstStyle/>
+          <a:p>
+            <a:fld id="{A9CD8630-C3CD-46DB-BE64-8561C8456588}" type="slidenum">
+              <a:rPr lang="de-DE" smtClean="0"/>
+              <a:pPr/>
+              <a:t>5</a:t>
+            </a:fld>
+            <a:endParaRPr lang="de-DE" dirty="0"/>
+          </a:p>
+        </p:txBody>
+      </p:sp>
+      <p:sp>
+        <p:nvSpPr>
+          <p:cNvPr id="6" name="Fußzeilenplatzhalter 5">
+            <a:extLst>
+              <a:ext uri="{FF2B5EF4-FFF2-40B4-BE49-F238E27FC236}">
+                <a16:creationId xmlns:a16="http://schemas.microsoft.com/office/drawing/2014/main" id="{FE550C06-9AEE-27C1-A34D-292E62B47FAF}"/>
               </a:ext>
             </a:extLst>
           </p:cNvPr>
@@ -10313,7 +10554,7 @@
           <a:p>
             <a:r>
               <a:rPr lang="de-DE"/>
-              <a:t>Cutting insert finder</a:t>
+              <a:t>Cutting-Insert-Finder</a:t>
             </a:r>
             <a:endParaRPr lang="de-DE" dirty="0"/>
           </a:p>
@@ -10372,7 +10613,7 @@
           <a:p>
             <a:r>
               <a:rPr lang="de-DE" dirty="0"/>
-              <a:t>Probleme bei der GUI Klasse</a:t>
+              <a:t>Grafische Oberfläche</a:t>
             </a:r>
           </a:p>
         </p:txBody>
@@ -10445,10 +10686,40 @@
       </p:sp>
       <p:sp>
         <p:nvSpPr>
-          <p:cNvPr id="4" name="Fußzeilenplatzhalter 3">
-            <a:extLst>
-              <a:ext uri="{FF2B5EF4-FFF2-40B4-BE49-F238E27FC236}">
-                <a16:creationId xmlns:a16="http://schemas.microsoft.com/office/drawing/2014/main" id="{7EBD4BA6-C5CC-B29B-E02B-7C86D6546940}"/>
+          <p:cNvPr id="5" name="Foliennummernplatzhalter 4">
+            <a:extLst>
+              <a:ext uri="{FF2B5EF4-FFF2-40B4-BE49-F238E27FC236}">
+                <a16:creationId xmlns:a16="http://schemas.microsoft.com/office/drawing/2014/main" id="{86FE5CA5-9D13-DB67-EEBC-84219DCC4E43}"/>
+              </a:ext>
+            </a:extLst>
+          </p:cNvPr>
+          <p:cNvSpPr>
+            <a:spLocks noGrp="1"/>
+          </p:cNvSpPr>
+          <p:nvPr>
+            <p:ph type="sldNum" sz="quarter" idx="12"/>
+          </p:nvPr>
+        </p:nvSpPr>
+        <p:spPr/>
+        <p:txBody>
+          <a:bodyPr/>
+          <a:lstStyle/>
+          <a:p>
+            <a:fld id="{A9CD8630-C3CD-46DB-BE64-8561C8456588}" type="slidenum">
+              <a:rPr lang="de-DE" smtClean="0"/>
+              <a:pPr/>
+              <a:t>6</a:t>
+            </a:fld>
+            <a:endParaRPr lang="de-DE" dirty="0"/>
+          </a:p>
+        </p:txBody>
+      </p:sp>
+      <p:sp>
+        <p:nvSpPr>
+          <p:cNvPr id="6" name="Fußzeilenplatzhalter 5">
+            <a:extLst>
+              <a:ext uri="{FF2B5EF4-FFF2-40B4-BE49-F238E27FC236}">
+                <a16:creationId xmlns:a16="http://schemas.microsoft.com/office/drawing/2014/main" id="{1B3CF5CF-1EA2-D593-F93A-1CB0093121E3}"/>
               </a:ext>
             </a:extLst>
           </p:cNvPr>
@@ -10466,7 +10737,7 @@
           <a:p>
             <a:r>
               <a:rPr lang="de-DE"/>
-              <a:t>Cutting insert finder</a:t>
+              <a:t>Cutting-Insert-Finder</a:t>
             </a:r>
             <a:endParaRPr lang="de-DE" dirty="0"/>
           </a:p>
@@ -10803,7 +11074,7 @@
           <a:p>
             <a:r>
               <a:rPr lang="de-DE" dirty="0"/>
-              <a:t>Probleme bei der GUI Klasse</a:t>
+              <a:t>Grafische Oberfläche</a:t>
             </a:r>
           </a:p>
         </p:txBody>
@@ -10907,10 +11178,40 @@
       </p:sp>
       <p:sp>
         <p:nvSpPr>
-          <p:cNvPr id="4" name="Fußzeilenplatzhalter 3">
-            <a:extLst>
-              <a:ext uri="{FF2B5EF4-FFF2-40B4-BE49-F238E27FC236}">
-                <a16:creationId xmlns:a16="http://schemas.microsoft.com/office/drawing/2014/main" id="{F6B925EB-5EE5-D748-87B9-1DF72F8C7B28}"/>
+          <p:cNvPr id="5" name="Foliennummernplatzhalter 4">
+            <a:extLst>
+              <a:ext uri="{FF2B5EF4-FFF2-40B4-BE49-F238E27FC236}">
+                <a16:creationId xmlns:a16="http://schemas.microsoft.com/office/drawing/2014/main" id="{3497E026-763C-18DD-FCD8-B6D661946667}"/>
+              </a:ext>
+            </a:extLst>
+          </p:cNvPr>
+          <p:cNvSpPr>
+            <a:spLocks noGrp="1"/>
+          </p:cNvSpPr>
+          <p:nvPr>
+            <p:ph type="sldNum" sz="quarter" idx="12"/>
+          </p:nvPr>
+        </p:nvSpPr>
+        <p:spPr/>
+        <p:txBody>
+          <a:bodyPr/>
+          <a:lstStyle/>
+          <a:p>
+            <a:fld id="{A9CD8630-C3CD-46DB-BE64-8561C8456588}" type="slidenum">
+              <a:rPr lang="de-DE" smtClean="0"/>
+              <a:pPr/>
+              <a:t>7</a:t>
+            </a:fld>
+            <a:endParaRPr lang="de-DE" dirty="0"/>
+          </a:p>
+        </p:txBody>
+      </p:sp>
+      <p:sp>
+        <p:nvSpPr>
+          <p:cNvPr id="6" name="Fußzeilenplatzhalter 5">
+            <a:extLst>
+              <a:ext uri="{FF2B5EF4-FFF2-40B4-BE49-F238E27FC236}">
+                <a16:creationId xmlns:a16="http://schemas.microsoft.com/office/drawing/2014/main" id="{418083F0-BC14-0EE1-39A2-E9056A60E0AC}"/>
               </a:ext>
             </a:extLst>
           </p:cNvPr>
@@ -10928,7 +11229,7 @@
           <a:p>
             <a:r>
               <a:rPr lang="de-DE"/>
-              <a:t>Cutting insert finder</a:t>
+              <a:t>Cutting-Insert-Finder</a:t>
             </a:r>
             <a:endParaRPr lang="de-DE" dirty="0"/>
           </a:p>
@@ -11265,7 +11566,7 @@
           <a:p>
             <a:r>
               <a:rPr lang="de-DE" dirty="0"/>
-              <a:t>Probleme bei der GUI Klasse</a:t>
+              <a:t>Grafische Oberfläche</a:t>
             </a:r>
           </a:p>
         </p:txBody>
@@ -11332,10 +11633,40 @@
       </p:sp>
       <p:sp>
         <p:nvSpPr>
-          <p:cNvPr id="4" name="Fußzeilenplatzhalter 3">
-            <a:extLst>
-              <a:ext uri="{FF2B5EF4-FFF2-40B4-BE49-F238E27FC236}">
-                <a16:creationId xmlns:a16="http://schemas.microsoft.com/office/drawing/2014/main" id="{95CBDFA8-D75E-1A54-FC65-1D76C71C1599}"/>
+          <p:cNvPr id="5" name="Foliennummernplatzhalter 4">
+            <a:extLst>
+              <a:ext uri="{FF2B5EF4-FFF2-40B4-BE49-F238E27FC236}">
+                <a16:creationId xmlns:a16="http://schemas.microsoft.com/office/drawing/2014/main" id="{53FD9280-58C8-6DC6-94DC-8B1F445A2D52}"/>
+              </a:ext>
+            </a:extLst>
+          </p:cNvPr>
+          <p:cNvSpPr>
+            <a:spLocks noGrp="1"/>
+          </p:cNvSpPr>
+          <p:nvPr>
+            <p:ph type="sldNum" sz="quarter" idx="12"/>
+          </p:nvPr>
+        </p:nvSpPr>
+        <p:spPr/>
+        <p:txBody>
+          <a:bodyPr/>
+          <a:lstStyle/>
+          <a:p>
+            <a:fld id="{A9CD8630-C3CD-46DB-BE64-8561C8456588}" type="slidenum">
+              <a:rPr lang="de-DE" smtClean="0"/>
+              <a:pPr/>
+              <a:t>8</a:t>
+            </a:fld>
+            <a:endParaRPr lang="de-DE" dirty="0"/>
+          </a:p>
+        </p:txBody>
+      </p:sp>
+      <p:sp>
+        <p:nvSpPr>
+          <p:cNvPr id="6" name="Fußzeilenplatzhalter 5">
+            <a:extLst>
+              <a:ext uri="{FF2B5EF4-FFF2-40B4-BE49-F238E27FC236}">
+                <a16:creationId xmlns:a16="http://schemas.microsoft.com/office/drawing/2014/main" id="{2D35D196-CE36-F7D0-2674-86FE96BD5218}"/>
               </a:ext>
             </a:extLst>
           </p:cNvPr>
@@ -11353,7 +11684,7 @@
           <a:p>
             <a:r>
               <a:rPr lang="de-DE"/>
-              <a:t>Cutting insert finder</a:t>
+              <a:t>Cutting-Insert-Finder</a:t>
             </a:r>
             <a:endParaRPr lang="de-DE" dirty="0"/>
           </a:p>
@@ -11641,7 +11972,7 @@
           <a:p>
             <a:r>
               <a:rPr lang="de-DE" dirty="0"/>
-              <a:t>Probleme bei der Datenbankverbindung</a:t>
+              <a:t>Datenbankverwaltung</a:t>
             </a:r>
           </a:p>
         </p:txBody>
@@ -11664,8 +11995,22 @@
         </p:nvSpPr>
         <p:spPr/>
         <p:txBody>
-          <a:bodyPr/>
-          <a:lstStyle/>
+          <a:bodyPr>
+            <a:normAutofit/>
+          </a:bodyPr>
+          <a:lstStyle/>
+          <a:p>
+            <a:pPr marL="0" indent="0">
+              <a:buNone/>
+            </a:pPr>
+            <a:r>
+              <a:rPr lang="de-DE" dirty="0"/>
+              <a:t>Fehlerquellen:</a:t>
+            </a:r>
+          </a:p>
+          <a:p>
+            <a:endParaRPr lang="de-DE" dirty="0"/>
+          </a:p>
           <a:p>
             <a:r>
               <a:rPr lang="de-DE" dirty="0"/>
@@ -11685,35 +12030,54 @@
             </a:r>
           </a:p>
           <a:p>
+            <a:pPr marL="0" indent="0">
+              <a:buNone/>
+            </a:pPr>
+            <a:r>
+              <a:rPr lang="de-DE" sz="2200" dirty="0">
+                <a:solidFill>
+                  <a:srgbClr val="0070C0"/>
+                </a:solidFill>
+              </a:rPr>
+              <a:t>abfrage = "SELECT * FROM [Schneidplatten Datenbank] WHERE Material = '"+material+ "' AND Bearbeitungsumfang = '"+</a:t>
+            </a:r>
+            <a:r>
+              <a:rPr lang="de-DE" sz="2200" dirty="0" err="1">
+                <a:solidFill>
+                  <a:srgbClr val="0070C0"/>
+                </a:solidFill>
+              </a:rPr>
+              <a:t>beaumfang</a:t>
+            </a:r>
+            <a:r>
+              <a:rPr lang="de-DE" sz="2200" dirty="0">
+                <a:solidFill>
+                  <a:srgbClr val="0070C0"/>
+                </a:solidFill>
+              </a:rPr>
+              <a:t>+"'AND Radius = '"+</a:t>
+            </a:r>
+            <a:r>
+              <a:rPr lang="de-DE" sz="2200" dirty="0" err="1">
+                <a:solidFill>
+                  <a:srgbClr val="0070C0"/>
+                </a:solidFill>
+              </a:rPr>
+              <a:t>radius</a:t>
+            </a:r>
+            <a:r>
+              <a:rPr lang="de-DE" sz="2200" dirty="0">
+                <a:solidFill>
+                  <a:srgbClr val="0070C0"/>
+                </a:solidFill>
+              </a:rPr>
+              <a:t>+"'";</a:t>
+            </a:r>
+          </a:p>
+          <a:p>
             <a:r>
               <a:rPr lang="de-DE" dirty="0" err="1"/>
-              <a:t>Ucanaccess</a:t>
-            </a:r>
-            <a:r>
-              <a:rPr lang="de-DE" dirty="0"/>
-              <a:t> </a:t>
-            </a:r>
-            <a:r>
-              <a:rPr lang="de-DE" dirty="0" err="1"/>
-              <a:t>libs</a:t>
-            </a:r>
-            <a:r>
-              <a:rPr lang="de-DE" dirty="0"/>
-              <a:t> nicht im Programm integriert</a:t>
-            </a:r>
-          </a:p>
-          <a:p>
-            <a:r>
-              <a:rPr lang="de-DE" dirty="0" err="1"/>
-              <a:t>Runable</a:t>
-            </a:r>
-            <a:r>
-              <a:rPr lang="de-DE" dirty="0"/>
-              <a:t> </a:t>
-            </a:r>
-            <a:r>
-              <a:rPr lang="de-DE" dirty="0" err="1"/>
-              <a:t>JarFiles</a:t>
+              <a:t>RunableJarFiles</a:t>
             </a:r>
             <a:r>
               <a:rPr lang="de-DE" dirty="0"/>
@@ -11727,10 +12091,40 @@
       </p:sp>
       <p:sp>
         <p:nvSpPr>
-          <p:cNvPr id="4" name="Fußzeilenplatzhalter 3">
-            <a:extLst>
-              <a:ext uri="{FF2B5EF4-FFF2-40B4-BE49-F238E27FC236}">
-                <a16:creationId xmlns:a16="http://schemas.microsoft.com/office/drawing/2014/main" id="{FAD4F188-1BD0-9BA3-1D49-1ED30027758C}"/>
+          <p:cNvPr id="5" name="Foliennummernplatzhalter 4">
+            <a:extLst>
+              <a:ext uri="{FF2B5EF4-FFF2-40B4-BE49-F238E27FC236}">
+                <a16:creationId xmlns:a16="http://schemas.microsoft.com/office/drawing/2014/main" id="{DA316C22-1532-E485-E204-06D85AACBD74}"/>
+              </a:ext>
+            </a:extLst>
+          </p:cNvPr>
+          <p:cNvSpPr>
+            <a:spLocks noGrp="1"/>
+          </p:cNvSpPr>
+          <p:nvPr>
+            <p:ph type="sldNum" sz="quarter" idx="12"/>
+          </p:nvPr>
+        </p:nvSpPr>
+        <p:spPr/>
+        <p:txBody>
+          <a:bodyPr/>
+          <a:lstStyle/>
+          <a:p>
+            <a:fld id="{A9CD8630-C3CD-46DB-BE64-8561C8456588}" type="slidenum">
+              <a:rPr lang="de-DE" smtClean="0"/>
+              <a:pPr/>
+              <a:t>9</a:t>
+            </a:fld>
+            <a:endParaRPr lang="de-DE" dirty="0"/>
+          </a:p>
+        </p:txBody>
+      </p:sp>
+      <p:sp>
+        <p:nvSpPr>
+          <p:cNvPr id="6" name="Fußzeilenplatzhalter 5">
+            <a:extLst>
+              <a:ext uri="{FF2B5EF4-FFF2-40B4-BE49-F238E27FC236}">
+                <a16:creationId xmlns:a16="http://schemas.microsoft.com/office/drawing/2014/main" id="{AF11525A-0CE1-EAD8-56B5-E05A66C0DF39}"/>
               </a:ext>
             </a:extLst>
           </p:cNvPr>
@@ -11747,10 +12141,9 @@
           <a:lstStyle/>
           <a:p>
             <a:r>
-              <a:rPr lang="de-DE"/>
-              <a:t>Cutting insert finder</a:t>
-            </a:r>
-            <a:endParaRPr lang="de-DE" dirty="0"/>
+              <a:rPr lang="de-DE" dirty="0"/>
+              <a:t>Cutting-Insert-Finder</a:t>
+            </a:r>
           </a:p>
         </p:txBody>
       </p:sp>
@@ -11849,7 +12242,7 @@
                                         <p:tgtEl>
                                           <p:spTgt spid="3">
                                             <p:txEl>
-                                              <p:pRg st="1" end="1"/>
+                                              <p:pRg st="2" end="2"/>
                                             </p:txEl>
                                           </p:spTgt>
                                         </p:tgtEl>
@@ -11898,7 +12291,7 @@
                                         <p:tgtEl>
                                           <p:spTgt spid="3">
                                             <p:txEl>
-                                              <p:pRg st="2" end="2"/>
+                                              <p:pRg st="3" end="3"/>
                                             </p:txEl>
                                           </p:spTgt>
                                         </p:tgtEl>
@@ -11947,7 +12340,7 @@
                                         <p:tgtEl>
                                           <p:spTgt spid="3">
                                             <p:txEl>
-                                              <p:pRg st="3" end="3"/>
+                                              <p:pRg st="4" end="4"/>
                                             </p:txEl>
                                           </p:spTgt>
                                         </p:tgtEl>
@@ -11996,7 +12389,56 @@
                                         <p:tgtEl>
                                           <p:spTgt spid="3">
                                             <p:txEl>
-                                              <p:pRg st="4" end="4"/>
+                                              <p:pRg st="5" end="5"/>
+                                            </p:txEl>
+                                          </p:spTgt>
+                                        </p:tgtEl>
+                                        <p:attrNameLst>
+                                          <p:attrName>style.visibility</p:attrName>
+                                        </p:attrNameLst>
+                                      </p:cBhvr>
+                                      <p:to>
+                                        <p:strVal val="visible"/>
+                                      </p:to>
+                                    </p:set>
+                                  </p:childTnLst>
+                                </p:cTn>
+                              </p:par>
+                            </p:childTnLst>
+                          </p:cTn>
+                        </p:par>
+                      </p:childTnLst>
+                    </p:cTn>
+                  </p:par>
+                  <p:par>
+                    <p:cTn id="23" fill="hold">
+                      <p:stCondLst>
+                        <p:cond delay="indefinite"/>
+                      </p:stCondLst>
+                      <p:childTnLst>
+                        <p:par>
+                          <p:cTn id="24" fill="hold">
+                            <p:stCondLst>
+                              <p:cond delay="0"/>
+                            </p:stCondLst>
+                            <p:childTnLst>
+                              <p:par>
+                                <p:cTn id="25" presetID="1" presetClass="entr" presetSubtype="0" fill="hold" grpId="0" nodeType="clickEffect">
+                                  <p:stCondLst>
+                                    <p:cond delay="0"/>
+                                  </p:stCondLst>
+                                  <p:childTnLst>
+                                    <p:set>
+                                      <p:cBhvr>
+                                        <p:cTn id="26" dur="1" fill="hold">
+                                          <p:stCondLst>
+                                            <p:cond delay="0"/>
+                                          </p:stCondLst>
+                                        </p:cTn>
+                                        <p:tgtEl>
+                                          <p:spTgt spid="3">
+                                            <p:txEl>
+                                              <p:pRg st="6" end="6"/>
                                             </p:txEl>
                                           </p:spTgt>
                                         </p:tgtEl>

</xml_diff>

<commit_message>
Kleine Änderungen kurz vor Präsentation
</commit_message>
<xml_diff>
--- a/4_Praesentation/CuttingInsert Finder.pptx
+++ b/4_Praesentation/CuttingInsert Finder.pptx
@@ -8494,20 +8494,24 @@
           <a:lstStyle/>
           <a:p>
             <a:r>
-              <a:rPr lang="de-DE"/>
+              <a:rPr lang="de-DE" dirty="0"/>
               <a:t>Grafische Oberfläche von Anfang an mit Layout-Manager programmieren</a:t>
             </a:r>
           </a:p>
           <a:p>
             <a:r>
-              <a:rPr lang="de-DE"/>
+              <a:rPr lang="de-DE" dirty="0"/>
               <a:t>Klassen sollten vor der Zusammenführung besser aufeinander abgestimmt werden</a:t>
             </a:r>
           </a:p>
           <a:p>
             <a:r>
-              <a:rPr lang="de-DE"/>
-              <a:t>JavaDoc Kommentare während Programmerstellung erstellen</a:t>
+              <a:rPr lang="de-DE" dirty="0" err="1"/>
+              <a:t>JavaDoc</a:t>
+            </a:r>
+            <a:r>
+              <a:rPr lang="de-DE" dirty="0"/>
+              <a:t> Kommentare während Programmerstellung erstellen</a:t>
             </a:r>
           </a:p>
           <a:p>
@@ -11597,7 +11601,7 @@
             </a:r>
             <a:r>
               <a:rPr lang="de-DE" dirty="0"/>
-              <a:t> mit kein Treffer überschrieben</a:t>
+              <a:t> mit „Kein Treffer“ überschrieben</a:t>
             </a:r>
           </a:p>
         </p:txBody>
@@ -12048,7 +12052,7 @@
           <a:p>
             <a:r>
               <a:rPr lang="de-DE" dirty="0" err="1"/>
-              <a:t>RunableJarFiles</a:t>
+              <a:t>RunableJarFile</a:t>
             </a:r>
             <a:r>
               <a:rPr lang="de-DE" dirty="0"/>

</xml_diff>